<commit_message>
Remove duplicates from sorted array
</commit_message>
<xml_diff>
--- a/assets/customized_image.pptx
+++ b/assets/customized_image.pptx
@@ -5875,7 +5875,7 @@
           <p:nvPr>
             <p:extLst>
               <p:ext uri="{D42A27DB-BD31-4B8C-83A1-F6EECF244321}">
-                <p14:modId xmlns:p14="http://schemas.microsoft.com/office/powerpoint/2010/main" val="2799935515"/>
+                <p14:modId xmlns:p14="http://schemas.microsoft.com/office/powerpoint/2010/main" val="1530065671"/>
               </p:ext>
             </p:extLst>
           </p:nvPr>
@@ -7203,10 +7203,10 @@
       </p:sp>
       <p:grpSp>
         <p:nvGrpSpPr>
-          <p:cNvPr id="3" name="Group 2">
-            <a:extLst>
-              <a:ext uri="{FF2B5EF4-FFF2-40B4-BE49-F238E27FC236}">
-                <a16:creationId xmlns:a16="http://schemas.microsoft.com/office/drawing/2014/main" id="{C965A83C-53D4-4377-A49B-60A434DC6C67}"/>
+          <p:cNvPr id="120" name="Group 119">
+            <a:extLst>
+              <a:ext uri="{FF2B5EF4-FFF2-40B4-BE49-F238E27FC236}">
+                <a16:creationId xmlns:a16="http://schemas.microsoft.com/office/drawing/2014/main" id="{6CDE5CC7-708A-48DC-91F9-BF29B67AE790}"/>
               </a:ext>
             </a:extLst>
           </p:cNvPr>
@@ -7217,1109 +7217,16 @@
           <a:xfrm>
             <a:off x="1469018" y="1888975"/>
             <a:ext cx="4107185" cy="2890083"/>
-            <a:chOff x="6257192" y="1503485"/>
+            <a:chOff x="1469018" y="1888975"/>
             <a:chExt cx="4107185" cy="2890083"/>
-          </a:xfrm>
-        </p:grpSpPr>
-        <p:sp>
-          <p:nvSpPr>
-            <p:cNvPr id="5" name="Oval 4">
-              <a:extLst>
-                <a:ext uri="{FF2B5EF4-FFF2-40B4-BE49-F238E27FC236}">
-                  <a16:creationId xmlns:a16="http://schemas.microsoft.com/office/drawing/2014/main" id="{B62EB648-0EEA-46C4-BC8E-E87D515BEA9F}"/>
-                </a:ext>
-              </a:extLst>
-            </p:cNvPr>
-            <p:cNvSpPr/>
-            <p:nvPr/>
-          </p:nvSpPr>
-          <p:spPr>
-            <a:xfrm>
-              <a:off x="7546730" y="1503485"/>
-              <a:ext cx="548640" cy="548640"/>
-            </a:xfrm>
-            <a:prstGeom prst="ellipse">
-              <a:avLst/>
-            </a:prstGeom>
-            <a:ln w="28575">
-              <a:solidFill>
-                <a:srgbClr val="7030A0"/>
-              </a:solidFill>
-            </a:ln>
-          </p:spPr>
-          <p:style>
-            <a:lnRef idx="2">
-              <a:schemeClr val="dk1"/>
-            </a:lnRef>
-            <a:fillRef idx="1">
-              <a:schemeClr val="lt1"/>
-            </a:fillRef>
-            <a:effectRef idx="0">
-              <a:schemeClr val="dk1"/>
-            </a:effectRef>
-            <a:fontRef idx="minor">
-              <a:schemeClr val="dk1"/>
-            </a:fontRef>
-          </p:style>
-          <p:txBody>
-            <a:bodyPr rtlCol="0" anchor="ctr"/>
-            <a:lstStyle/>
-            <a:p>
-              <a:pPr algn="ctr"/>
-              <a:r>
-                <a:rPr lang="en-US" sz="1400" b="1" dirty="0"/>
-                <a:t>2</a:t>
-              </a:r>
-            </a:p>
-          </p:txBody>
-        </p:sp>
-        <p:sp>
-          <p:nvSpPr>
-            <p:cNvPr id="6" name="Oval 5">
-              <a:extLst>
-                <a:ext uri="{FF2B5EF4-FFF2-40B4-BE49-F238E27FC236}">
-                  <a16:creationId xmlns:a16="http://schemas.microsoft.com/office/drawing/2014/main" id="{8128AA59-F316-4B09-8A36-E8CC4D24001D}"/>
-                </a:ext>
-              </a:extLst>
-            </p:cNvPr>
-            <p:cNvSpPr/>
-            <p:nvPr/>
-          </p:nvSpPr>
-          <p:spPr>
-            <a:xfrm>
-              <a:off x="8583563" y="2284266"/>
-              <a:ext cx="548640" cy="548640"/>
-            </a:xfrm>
-            <a:prstGeom prst="ellipse">
-              <a:avLst/>
-            </a:prstGeom>
-            <a:ln w="19050">
-              <a:solidFill>
-                <a:schemeClr val="accent4">
-                  <a:lumMod val="75000"/>
-                </a:schemeClr>
-              </a:solidFill>
-            </a:ln>
-          </p:spPr>
-          <p:style>
-            <a:lnRef idx="2">
-              <a:schemeClr val="dk1"/>
-            </a:lnRef>
-            <a:fillRef idx="1">
-              <a:schemeClr val="lt1"/>
-            </a:fillRef>
-            <a:effectRef idx="0">
-              <a:schemeClr val="dk1"/>
-            </a:effectRef>
-            <a:fontRef idx="minor">
-              <a:schemeClr val="dk1"/>
-            </a:fontRef>
-          </p:style>
-          <p:txBody>
-            <a:bodyPr rtlCol="0" anchor="ctr"/>
-            <a:lstStyle/>
-            <a:p>
-              <a:pPr algn="ctr"/>
-              <a:r>
-                <a:rPr lang="en-US" sz="1400" b="1" dirty="0"/>
-                <a:t>9</a:t>
-              </a:r>
-            </a:p>
-          </p:txBody>
-        </p:sp>
-        <p:sp>
-          <p:nvSpPr>
-            <p:cNvPr id="8" name="Oval 7">
-              <a:extLst>
-                <a:ext uri="{FF2B5EF4-FFF2-40B4-BE49-F238E27FC236}">
-                  <a16:creationId xmlns:a16="http://schemas.microsoft.com/office/drawing/2014/main" id="{75906CA7-B404-420A-959D-082B81569770}"/>
-                </a:ext>
-              </a:extLst>
-            </p:cNvPr>
-            <p:cNvSpPr/>
-            <p:nvPr/>
-          </p:nvSpPr>
-          <p:spPr>
-            <a:xfrm>
-              <a:off x="8244940" y="3829929"/>
-              <a:ext cx="548640" cy="548640"/>
-            </a:xfrm>
-            <a:prstGeom prst="ellipse">
-              <a:avLst/>
-            </a:prstGeom>
-            <a:ln w="28575">
-              <a:solidFill>
-                <a:schemeClr val="accent6">
-                  <a:lumMod val="75000"/>
-                </a:schemeClr>
-              </a:solidFill>
-            </a:ln>
-          </p:spPr>
-          <p:style>
-            <a:lnRef idx="2">
-              <a:schemeClr val="dk1"/>
-            </a:lnRef>
-            <a:fillRef idx="1">
-              <a:schemeClr val="lt1"/>
-            </a:fillRef>
-            <a:effectRef idx="0">
-              <a:schemeClr val="dk1"/>
-            </a:effectRef>
-            <a:fontRef idx="minor">
-              <a:schemeClr val="dk1"/>
-            </a:fontRef>
-          </p:style>
-          <p:txBody>
-            <a:bodyPr rtlCol="0" anchor="ctr"/>
-            <a:lstStyle/>
-            <a:p>
-              <a:pPr algn="ctr"/>
-              <a:r>
-                <a:rPr lang="en-US" sz="1400" b="1" dirty="0"/>
-                <a:t>3</a:t>
-              </a:r>
-            </a:p>
-          </p:txBody>
-        </p:sp>
-        <p:sp>
-          <p:nvSpPr>
-            <p:cNvPr id="9" name="Oval 8">
-              <a:extLst>
-                <a:ext uri="{FF2B5EF4-FFF2-40B4-BE49-F238E27FC236}">
-                  <a16:creationId xmlns:a16="http://schemas.microsoft.com/office/drawing/2014/main" id="{FDF2B421-7336-4961-95DF-59205850B70A}"/>
-                </a:ext>
-              </a:extLst>
-            </p:cNvPr>
-            <p:cNvSpPr/>
-            <p:nvPr/>
-          </p:nvSpPr>
-          <p:spPr>
-            <a:xfrm>
-              <a:off x="6576646" y="3829929"/>
-              <a:ext cx="548640" cy="548640"/>
-            </a:xfrm>
-            <a:prstGeom prst="ellipse">
-              <a:avLst/>
-            </a:prstGeom>
-            <a:ln w="28575">
-              <a:solidFill>
-                <a:schemeClr val="accent6">
-                  <a:lumMod val="75000"/>
-                </a:schemeClr>
-              </a:solidFill>
-            </a:ln>
-          </p:spPr>
-          <p:style>
-            <a:lnRef idx="2">
-              <a:schemeClr val="dk1"/>
-            </a:lnRef>
-            <a:fillRef idx="1">
-              <a:schemeClr val="lt1"/>
-            </a:fillRef>
-            <a:effectRef idx="0">
-              <a:schemeClr val="dk1"/>
-            </a:effectRef>
-            <a:fontRef idx="minor">
-              <a:schemeClr val="dk1"/>
-            </a:fontRef>
-          </p:style>
-          <p:txBody>
-            <a:bodyPr rtlCol="0" anchor="ctr"/>
-            <a:lstStyle/>
-            <a:p>
-              <a:pPr algn="ctr"/>
-              <a:r>
-                <a:rPr lang="en-US" sz="1400" b="1" dirty="0"/>
-                <a:t>5</a:t>
-              </a:r>
-            </a:p>
-          </p:txBody>
-        </p:sp>
-        <p:sp>
-          <p:nvSpPr>
-            <p:cNvPr id="10" name="Oval 9">
-              <a:extLst>
-                <a:ext uri="{FF2B5EF4-FFF2-40B4-BE49-F238E27FC236}">
-                  <a16:creationId xmlns:a16="http://schemas.microsoft.com/office/drawing/2014/main" id="{0A978841-CEB8-4B13-892F-74878DF066FB}"/>
-                </a:ext>
-              </a:extLst>
-            </p:cNvPr>
-            <p:cNvSpPr/>
-            <p:nvPr/>
-          </p:nvSpPr>
-          <p:spPr>
-            <a:xfrm>
-              <a:off x="7186245" y="3829929"/>
-              <a:ext cx="548640" cy="548640"/>
-            </a:xfrm>
-            <a:prstGeom prst="ellipse">
-              <a:avLst/>
-            </a:prstGeom>
-            <a:ln w="28575">
-              <a:solidFill>
-                <a:schemeClr val="accent6">
-                  <a:lumMod val="75000"/>
-                </a:schemeClr>
-              </a:solidFill>
-            </a:ln>
-          </p:spPr>
-          <p:style>
-            <a:lnRef idx="2">
-              <a:schemeClr val="dk1"/>
-            </a:lnRef>
-            <a:fillRef idx="1">
-              <a:schemeClr val="lt1"/>
-            </a:fillRef>
-            <a:effectRef idx="0">
-              <a:schemeClr val="dk1"/>
-            </a:effectRef>
-            <a:fontRef idx="minor">
-              <a:schemeClr val="dk1"/>
-            </a:fontRef>
-          </p:style>
-          <p:txBody>
-            <a:bodyPr rtlCol="0" anchor="ctr"/>
-            <a:lstStyle/>
-            <a:p>
-              <a:pPr algn="ctr"/>
-              <a:r>
-                <a:rPr lang="en-US" sz="1400" b="1" dirty="0"/>
-                <a:t>10</a:t>
-              </a:r>
-            </a:p>
-          </p:txBody>
-        </p:sp>
-        <p:sp>
-          <p:nvSpPr>
-            <p:cNvPr id="11" name="Oval 10">
-              <a:extLst>
-                <a:ext uri="{FF2B5EF4-FFF2-40B4-BE49-F238E27FC236}">
-                  <a16:creationId xmlns:a16="http://schemas.microsoft.com/office/drawing/2014/main" id="{FF3D7E7E-D3C5-48E8-B266-69D476B120C3}"/>
-                </a:ext>
-              </a:extLst>
-            </p:cNvPr>
-            <p:cNvSpPr/>
-            <p:nvPr/>
-          </p:nvSpPr>
-          <p:spPr>
-            <a:xfrm>
-              <a:off x="8917661" y="3844928"/>
-              <a:ext cx="548640" cy="548640"/>
-            </a:xfrm>
-            <a:prstGeom prst="ellipse">
-              <a:avLst/>
-            </a:prstGeom>
-            <a:ln w="28575">
-              <a:solidFill>
-                <a:schemeClr val="accent6">
-                  <a:lumMod val="75000"/>
-                </a:schemeClr>
-              </a:solidFill>
-            </a:ln>
-          </p:spPr>
-          <p:style>
-            <a:lnRef idx="2">
-              <a:schemeClr val="dk1"/>
-            </a:lnRef>
-            <a:fillRef idx="1">
-              <a:schemeClr val="lt1"/>
-            </a:fillRef>
-            <a:effectRef idx="0">
-              <a:schemeClr val="dk1"/>
-            </a:effectRef>
-            <a:fontRef idx="minor">
-              <a:schemeClr val="dk1"/>
-            </a:fontRef>
-          </p:style>
-          <p:txBody>
-            <a:bodyPr rtlCol="0" anchor="ctr"/>
-            <a:lstStyle/>
-            <a:p>
-              <a:pPr algn="ctr"/>
-              <a:r>
-                <a:rPr lang="en-US" sz="1400" b="1" dirty="0"/>
-                <a:t>4</a:t>
-              </a:r>
-            </a:p>
-          </p:txBody>
-        </p:sp>
-        <p:sp>
-          <p:nvSpPr>
-            <p:cNvPr id="12" name="Oval 11">
-              <a:extLst>
-                <a:ext uri="{FF2B5EF4-FFF2-40B4-BE49-F238E27FC236}">
-                  <a16:creationId xmlns:a16="http://schemas.microsoft.com/office/drawing/2014/main" id="{6311040C-2E5E-46AE-A584-2EA130EBCCB7}"/>
-                </a:ext>
-              </a:extLst>
-            </p:cNvPr>
-            <p:cNvSpPr/>
-            <p:nvPr/>
-          </p:nvSpPr>
-          <p:spPr>
-            <a:xfrm>
-              <a:off x="6901961" y="3006969"/>
-              <a:ext cx="548640" cy="548640"/>
-            </a:xfrm>
-            <a:prstGeom prst="ellipse">
-              <a:avLst/>
-            </a:prstGeom>
-            <a:ln w="19050">
-              <a:solidFill>
-                <a:schemeClr val="accent4">
-                  <a:lumMod val="75000"/>
-                </a:schemeClr>
-              </a:solidFill>
-            </a:ln>
-          </p:spPr>
-          <p:style>
-            <a:lnRef idx="2">
-              <a:schemeClr val="dk1"/>
-            </a:lnRef>
-            <a:fillRef idx="1">
-              <a:schemeClr val="lt1"/>
-            </a:fillRef>
-            <a:effectRef idx="0">
-              <a:schemeClr val="dk1"/>
-            </a:effectRef>
-            <a:fontRef idx="minor">
-              <a:schemeClr val="dk1"/>
-            </a:fontRef>
-          </p:style>
-          <p:txBody>
-            <a:bodyPr rtlCol="0" anchor="ctr"/>
-            <a:lstStyle/>
-            <a:p>
-              <a:pPr algn="ctr"/>
-              <a:r>
-                <a:rPr lang="en-US" sz="1400" b="1" dirty="0"/>
-                <a:t>6</a:t>
-              </a:r>
-            </a:p>
-          </p:txBody>
-        </p:sp>
-        <p:sp>
-          <p:nvSpPr>
-            <p:cNvPr id="13" name="Oval 12">
-              <a:extLst>
-                <a:ext uri="{FF2B5EF4-FFF2-40B4-BE49-F238E27FC236}">
-                  <a16:creationId xmlns:a16="http://schemas.microsoft.com/office/drawing/2014/main" id="{DC6887E2-F520-43DF-A704-573BA34256DD}"/>
-                </a:ext>
-              </a:extLst>
-            </p:cNvPr>
-            <p:cNvSpPr/>
-            <p:nvPr/>
-          </p:nvSpPr>
-          <p:spPr>
-            <a:xfrm>
-              <a:off x="6576646" y="2287466"/>
-              <a:ext cx="548640" cy="548640"/>
-            </a:xfrm>
-            <a:prstGeom prst="ellipse">
-              <a:avLst/>
-            </a:prstGeom>
-            <a:ln w="19050">
-              <a:solidFill>
-                <a:schemeClr val="accent4">
-                  <a:lumMod val="75000"/>
-                </a:schemeClr>
-              </a:solidFill>
-            </a:ln>
-          </p:spPr>
-          <p:style>
-            <a:lnRef idx="2">
-              <a:schemeClr val="dk1"/>
-            </a:lnRef>
-            <a:fillRef idx="1">
-              <a:schemeClr val="lt1"/>
-            </a:fillRef>
-            <a:effectRef idx="0">
-              <a:schemeClr val="dk1"/>
-            </a:effectRef>
-            <a:fontRef idx="minor">
-              <a:schemeClr val="dk1"/>
-            </a:fontRef>
-          </p:style>
-          <p:txBody>
-            <a:bodyPr rtlCol="0" anchor="ctr"/>
-            <a:lstStyle/>
-            <a:p>
-              <a:pPr algn="ctr"/>
-              <a:r>
-                <a:rPr lang="en-US" sz="1400" b="1" dirty="0"/>
-                <a:t>7</a:t>
-              </a:r>
-            </a:p>
-          </p:txBody>
-        </p:sp>
-        <p:sp>
-          <p:nvSpPr>
-            <p:cNvPr id="14" name="Oval 13">
-              <a:extLst>
-                <a:ext uri="{FF2B5EF4-FFF2-40B4-BE49-F238E27FC236}">
-                  <a16:creationId xmlns:a16="http://schemas.microsoft.com/office/drawing/2014/main" id="{61596B00-0D0B-43E3-A71E-3003CF6D643A}"/>
-                </a:ext>
-              </a:extLst>
-            </p:cNvPr>
-            <p:cNvSpPr/>
-            <p:nvPr/>
-          </p:nvSpPr>
-          <p:spPr>
-            <a:xfrm>
-              <a:off x="8583563" y="3006969"/>
-              <a:ext cx="548640" cy="548640"/>
-            </a:xfrm>
-            <a:prstGeom prst="ellipse">
-              <a:avLst/>
-            </a:prstGeom>
-            <a:ln w="19050">
-              <a:solidFill>
-                <a:schemeClr val="accent4">
-                  <a:lumMod val="75000"/>
-                </a:schemeClr>
-              </a:solidFill>
-            </a:ln>
-          </p:spPr>
-          <p:style>
-            <a:lnRef idx="2">
-              <a:schemeClr val="dk1"/>
-            </a:lnRef>
-            <a:fillRef idx="1">
-              <a:schemeClr val="lt1"/>
-            </a:fillRef>
-            <a:effectRef idx="0">
-              <a:schemeClr val="dk1"/>
-            </a:effectRef>
-            <a:fontRef idx="minor">
-              <a:schemeClr val="dk1"/>
-            </a:fontRef>
-          </p:style>
-          <p:txBody>
-            <a:bodyPr rtlCol="0" anchor="ctr"/>
-            <a:lstStyle/>
-            <a:p>
-              <a:pPr algn="ctr"/>
-              <a:r>
-                <a:rPr lang="en-US" sz="1400" b="1" dirty="0"/>
-                <a:t>8</a:t>
-              </a:r>
-            </a:p>
-          </p:txBody>
-        </p:sp>
-        <p:sp>
-          <p:nvSpPr>
-            <p:cNvPr id="16" name="Oval 15">
-              <a:extLst>
-                <a:ext uri="{FF2B5EF4-FFF2-40B4-BE49-F238E27FC236}">
-                  <a16:creationId xmlns:a16="http://schemas.microsoft.com/office/drawing/2014/main" id="{9A24B021-A0D2-4069-863D-93EEC94569A4}"/>
-                </a:ext>
-              </a:extLst>
-            </p:cNvPr>
-            <p:cNvSpPr/>
-            <p:nvPr/>
-          </p:nvSpPr>
-          <p:spPr>
-            <a:xfrm>
-              <a:off x="6257192" y="3006969"/>
-              <a:ext cx="548640" cy="548640"/>
-            </a:xfrm>
-            <a:prstGeom prst="ellipse">
-              <a:avLst/>
-            </a:prstGeom>
-            <a:ln w="28575">
-              <a:solidFill>
-                <a:schemeClr val="accent6">
-                  <a:lumMod val="75000"/>
-                </a:schemeClr>
-              </a:solidFill>
-            </a:ln>
-          </p:spPr>
-          <p:style>
-            <a:lnRef idx="2">
-              <a:schemeClr val="dk1"/>
-            </a:lnRef>
-            <a:fillRef idx="1">
-              <a:schemeClr val="lt1"/>
-            </a:fillRef>
-            <a:effectRef idx="0">
-              <a:schemeClr val="dk1"/>
-            </a:effectRef>
-            <a:fontRef idx="minor">
-              <a:schemeClr val="dk1"/>
-            </a:fontRef>
-          </p:style>
-          <p:txBody>
-            <a:bodyPr rtlCol="0" anchor="ctr"/>
-            <a:lstStyle/>
-            <a:p>
-              <a:pPr algn="ctr"/>
-              <a:r>
-                <a:rPr lang="en-US" sz="1400" b="1" dirty="0"/>
-                <a:t>1</a:t>
-              </a:r>
-            </a:p>
-          </p:txBody>
-        </p:sp>
-        <p:cxnSp>
-          <p:nvCxnSpPr>
-            <p:cNvPr id="18" name="Connector: Curved 17">
-              <a:extLst>
-                <a:ext uri="{FF2B5EF4-FFF2-40B4-BE49-F238E27FC236}">
-                  <a16:creationId xmlns:a16="http://schemas.microsoft.com/office/drawing/2014/main" id="{CFBA7BB1-36B3-41A5-87C2-28F6B30BDF07}"/>
-                </a:ext>
-              </a:extLst>
-            </p:cNvPr>
-            <p:cNvCxnSpPr>
-              <a:cxnSpLocks/>
-              <a:stCxn id="5" idx="4"/>
-              <a:endCxn id="13" idx="0"/>
-            </p:cNvCxnSpPr>
-            <p:nvPr/>
-          </p:nvCxnSpPr>
-          <p:spPr>
-            <a:xfrm rot="5400000">
-              <a:off x="7218338" y="1684753"/>
-              <a:ext cx="235341" cy="970084"/>
-            </a:xfrm>
-            <a:prstGeom prst="curvedConnector3">
-              <a:avLst>
-                <a:gd name="adj1" fmla="val 50000"/>
-              </a:avLst>
-            </a:prstGeom>
-          </p:spPr>
-          <p:style>
-            <a:lnRef idx="3">
-              <a:schemeClr val="accent1"/>
-            </a:lnRef>
-            <a:fillRef idx="0">
-              <a:schemeClr val="accent1"/>
-            </a:fillRef>
-            <a:effectRef idx="2">
-              <a:schemeClr val="accent1"/>
-            </a:effectRef>
-            <a:fontRef idx="minor">
-              <a:schemeClr val="tx1"/>
-            </a:fontRef>
-          </p:style>
-        </p:cxnSp>
-        <p:cxnSp>
-          <p:nvCxnSpPr>
-            <p:cNvPr id="19" name="Connector: Curved 18">
-              <a:extLst>
-                <a:ext uri="{FF2B5EF4-FFF2-40B4-BE49-F238E27FC236}">
-                  <a16:creationId xmlns:a16="http://schemas.microsoft.com/office/drawing/2014/main" id="{3002A634-AFFA-4FFF-A40B-C4AD3067757D}"/>
-                </a:ext>
-              </a:extLst>
-            </p:cNvPr>
-            <p:cNvCxnSpPr>
-              <a:cxnSpLocks/>
-              <a:stCxn id="13" idx="4"/>
-              <a:endCxn id="12" idx="0"/>
-            </p:cNvCxnSpPr>
-            <p:nvPr/>
-          </p:nvCxnSpPr>
-          <p:spPr>
-            <a:xfrm rot="16200000" flipH="1">
-              <a:off x="6928192" y="2758879"/>
-              <a:ext cx="170863" cy="325315"/>
-            </a:xfrm>
-            <a:prstGeom prst="curvedConnector3">
-              <a:avLst/>
-            </a:prstGeom>
-          </p:spPr>
-          <p:style>
-            <a:lnRef idx="3">
-              <a:schemeClr val="accent1"/>
-            </a:lnRef>
-            <a:fillRef idx="0">
-              <a:schemeClr val="accent1"/>
-            </a:fillRef>
-            <a:effectRef idx="2">
-              <a:schemeClr val="accent1"/>
-            </a:effectRef>
-            <a:fontRef idx="minor">
-              <a:schemeClr val="tx1"/>
-            </a:fontRef>
-          </p:style>
-        </p:cxnSp>
-        <p:cxnSp>
-          <p:nvCxnSpPr>
-            <p:cNvPr id="20" name="Connector: Curved 19">
-              <a:extLst>
-                <a:ext uri="{FF2B5EF4-FFF2-40B4-BE49-F238E27FC236}">
-                  <a16:creationId xmlns:a16="http://schemas.microsoft.com/office/drawing/2014/main" id="{C64F6F2F-20FD-4BBF-8B96-63804EB7F55C}"/>
-                </a:ext>
-              </a:extLst>
-            </p:cNvPr>
-            <p:cNvCxnSpPr>
-              <a:cxnSpLocks/>
-              <a:stCxn id="13" idx="4"/>
-              <a:endCxn id="16" idx="0"/>
-            </p:cNvCxnSpPr>
-            <p:nvPr/>
-          </p:nvCxnSpPr>
-          <p:spPr>
-            <a:xfrm rot="5400000">
-              <a:off x="6605808" y="2761810"/>
-              <a:ext cx="170863" cy="319454"/>
-            </a:xfrm>
-            <a:prstGeom prst="curvedConnector3">
-              <a:avLst>
-                <a:gd name="adj1" fmla="val 50000"/>
-              </a:avLst>
-            </a:prstGeom>
-          </p:spPr>
-          <p:style>
-            <a:lnRef idx="3">
-              <a:schemeClr val="accent1"/>
-            </a:lnRef>
-            <a:fillRef idx="0">
-              <a:schemeClr val="accent1"/>
-            </a:fillRef>
-            <a:effectRef idx="2">
-              <a:schemeClr val="accent1"/>
-            </a:effectRef>
-            <a:fontRef idx="minor">
-              <a:schemeClr val="tx1"/>
-            </a:fontRef>
-          </p:style>
-        </p:cxnSp>
-        <p:cxnSp>
-          <p:nvCxnSpPr>
-            <p:cNvPr id="21" name="Connector: Curved 20">
-              <a:extLst>
-                <a:ext uri="{FF2B5EF4-FFF2-40B4-BE49-F238E27FC236}">
-                  <a16:creationId xmlns:a16="http://schemas.microsoft.com/office/drawing/2014/main" id="{1B3AF1F9-F77E-4F99-8F8B-A881EE1FA49B}"/>
-                </a:ext>
-              </a:extLst>
-            </p:cNvPr>
-            <p:cNvCxnSpPr>
-              <a:cxnSpLocks/>
-              <a:stCxn id="12" idx="4"/>
-              <a:endCxn id="9" idx="0"/>
-            </p:cNvCxnSpPr>
-            <p:nvPr/>
-          </p:nvCxnSpPr>
-          <p:spPr>
-            <a:xfrm rot="5400000">
-              <a:off x="6876464" y="3530112"/>
-              <a:ext cx="274320" cy="325315"/>
-            </a:xfrm>
-            <a:prstGeom prst="curvedConnector3">
-              <a:avLst>
-                <a:gd name="adj1" fmla="val 50000"/>
-              </a:avLst>
-            </a:prstGeom>
-          </p:spPr>
-          <p:style>
-            <a:lnRef idx="3">
-              <a:schemeClr val="accent1"/>
-            </a:lnRef>
-            <a:fillRef idx="0">
-              <a:schemeClr val="accent1"/>
-            </a:fillRef>
-            <a:effectRef idx="2">
-              <a:schemeClr val="accent1"/>
-            </a:effectRef>
-            <a:fontRef idx="minor">
-              <a:schemeClr val="tx1"/>
-            </a:fontRef>
-          </p:style>
-        </p:cxnSp>
-        <p:cxnSp>
-          <p:nvCxnSpPr>
-            <p:cNvPr id="22" name="Connector: Curved 21">
-              <a:extLst>
-                <a:ext uri="{FF2B5EF4-FFF2-40B4-BE49-F238E27FC236}">
-                  <a16:creationId xmlns:a16="http://schemas.microsoft.com/office/drawing/2014/main" id="{4A507AF4-F3B9-4353-BF1A-78BAA3E4ADE8}"/>
-                </a:ext>
-              </a:extLst>
-            </p:cNvPr>
-            <p:cNvCxnSpPr>
-              <a:cxnSpLocks/>
-              <a:stCxn id="12" idx="4"/>
-              <a:endCxn id="10" idx="0"/>
-            </p:cNvCxnSpPr>
-            <p:nvPr/>
-          </p:nvCxnSpPr>
-          <p:spPr>
-            <a:xfrm rot="16200000" flipH="1">
-              <a:off x="7181263" y="3550627"/>
-              <a:ext cx="274320" cy="284284"/>
-            </a:xfrm>
-            <a:prstGeom prst="curvedConnector3">
-              <a:avLst>
-                <a:gd name="adj1" fmla="val 50000"/>
-              </a:avLst>
-            </a:prstGeom>
-          </p:spPr>
-          <p:style>
-            <a:lnRef idx="3">
-              <a:schemeClr val="accent1"/>
-            </a:lnRef>
-            <a:fillRef idx="0">
-              <a:schemeClr val="accent1"/>
-            </a:fillRef>
-            <a:effectRef idx="2">
-              <a:schemeClr val="accent1"/>
-            </a:effectRef>
-            <a:fontRef idx="minor">
-              <a:schemeClr val="tx1"/>
-            </a:fontRef>
-          </p:style>
-        </p:cxnSp>
-        <p:cxnSp>
-          <p:nvCxnSpPr>
-            <p:cNvPr id="23" name="Connector: Curved 22">
-              <a:extLst>
-                <a:ext uri="{FF2B5EF4-FFF2-40B4-BE49-F238E27FC236}">
-                  <a16:creationId xmlns:a16="http://schemas.microsoft.com/office/drawing/2014/main" id="{30BC02C4-1BB9-4B2A-B078-84DEB68681D5}"/>
-                </a:ext>
-              </a:extLst>
-            </p:cNvPr>
-            <p:cNvCxnSpPr>
-              <a:cxnSpLocks/>
-              <a:stCxn id="14" idx="4"/>
-              <a:endCxn id="8" idx="0"/>
-            </p:cNvCxnSpPr>
-            <p:nvPr/>
-          </p:nvCxnSpPr>
-          <p:spPr>
-            <a:xfrm rot="5400000">
-              <a:off x="8551412" y="3523458"/>
-              <a:ext cx="274320" cy="338623"/>
-            </a:xfrm>
-            <a:prstGeom prst="curvedConnector3">
-              <a:avLst>
-                <a:gd name="adj1" fmla="val 50000"/>
-              </a:avLst>
-            </a:prstGeom>
-          </p:spPr>
-          <p:style>
-            <a:lnRef idx="3">
-              <a:schemeClr val="accent1"/>
-            </a:lnRef>
-            <a:fillRef idx="0">
-              <a:schemeClr val="accent1"/>
-            </a:fillRef>
-            <a:effectRef idx="2">
-              <a:schemeClr val="accent1"/>
-            </a:effectRef>
-            <a:fontRef idx="minor">
-              <a:schemeClr val="tx1"/>
-            </a:fontRef>
-          </p:style>
-        </p:cxnSp>
-        <p:cxnSp>
-          <p:nvCxnSpPr>
-            <p:cNvPr id="24" name="Connector: Curved 23">
-              <a:extLst>
-                <a:ext uri="{FF2B5EF4-FFF2-40B4-BE49-F238E27FC236}">
-                  <a16:creationId xmlns:a16="http://schemas.microsoft.com/office/drawing/2014/main" id="{30638E03-9D54-437C-9AAD-07136FCB0FC4}"/>
-                </a:ext>
-              </a:extLst>
-            </p:cNvPr>
-            <p:cNvCxnSpPr>
-              <a:cxnSpLocks/>
-              <a:stCxn id="14" idx="4"/>
-              <a:endCxn id="11" idx="0"/>
-            </p:cNvCxnSpPr>
-            <p:nvPr/>
-          </p:nvCxnSpPr>
-          <p:spPr>
-            <a:xfrm rot="16200000" flipH="1">
-              <a:off x="8880273" y="3533219"/>
-              <a:ext cx="289319" cy="334098"/>
-            </a:xfrm>
-            <a:prstGeom prst="curvedConnector3">
-              <a:avLst>
-                <a:gd name="adj1" fmla="val 50000"/>
-              </a:avLst>
-            </a:prstGeom>
-          </p:spPr>
-          <p:style>
-            <a:lnRef idx="3">
-              <a:schemeClr val="accent1"/>
-            </a:lnRef>
-            <a:fillRef idx="0">
-              <a:schemeClr val="accent1"/>
-            </a:fillRef>
-            <a:effectRef idx="2">
-              <a:schemeClr val="accent1"/>
-            </a:effectRef>
-            <a:fontRef idx="minor">
-              <a:schemeClr val="tx1"/>
-            </a:fontRef>
-          </p:style>
-        </p:cxnSp>
-        <p:cxnSp>
-          <p:nvCxnSpPr>
-            <p:cNvPr id="26" name="Straight Connector 25">
-              <a:extLst>
-                <a:ext uri="{FF2B5EF4-FFF2-40B4-BE49-F238E27FC236}">
-                  <a16:creationId xmlns:a16="http://schemas.microsoft.com/office/drawing/2014/main" id="{D39B932B-4BCA-481D-AD94-44E691F719BD}"/>
-                </a:ext>
-              </a:extLst>
-            </p:cNvPr>
-            <p:cNvCxnSpPr>
-              <a:cxnSpLocks/>
-              <a:stCxn id="6" idx="4"/>
-              <a:endCxn id="14" idx="0"/>
-            </p:cNvCxnSpPr>
-            <p:nvPr/>
-          </p:nvCxnSpPr>
-          <p:spPr>
-            <a:xfrm>
-              <a:off x="8857883" y="2832906"/>
-              <a:ext cx="0" cy="174063"/>
-            </a:xfrm>
-            <a:prstGeom prst="line">
-              <a:avLst/>
-            </a:prstGeom>
-          </p:spPr>
-          <p:style>
-            <a:lnRef idx="3">
-              <a:schemeClr val="accent1"/>
-            </a:lnRef>
-            <a:fillRef idx="0">
-              <a:schemeClr val="accent1"/>
-            </a:fillRef>
-            <a:effectRef idx="2">
-              <a:schemeClr val="accent1"/>
-            </a:effectRef>
-            <a:fontRef idx="minor">
-              <a:schemeClr val="tx1"/>
-            </a:fontRef>
-          </p:style>
-        </p:cxnSp>
-        <p:sp>
-          <p:nvSpPr>
-            <p:cNvPr id="28" name="TextBox 27">
-              <a:extLst>
-                <a:ext uri="{FF2B5EF4-FFF2-40B4-BE49-F238E27FC236}">
-                  <a16:creationId xmlns:a16="http://schemas.microsoft.com/office/drawing/2014/main" id="{DF35320D-638B-4E3F-A22B-F07B09C58652}"/>
-                </a:ext>
-              </a:extLst>
-            </p:cNvPr>
-            <p:cNvSpPr txBox="1"/>
-            <p:nvPr/>
-          </p:nvSpPr>
-          <p:spPr>
-            <a:xfrm>
-              <a:off x="8109660" y="1617030"/>
-              <a:ext cx="819199" cy="276999"/>
-            </a:xfrm>
-            <a:prstGeom prst="rect">
-              <a:avLst/>
-            </a:prstGeom>
-            <a:noFill/>
-          </p:spPr>
-          <p:txBody>
-            <a:bodyPr wrap="none" rtlCol="0">
-              <a:spAutoFit/>
-            </a:bodyPr>
-            <a:lstStyle/>
-            <a:p>
-              <a:r>
-                <a:rPr lang="en-US" sz="1200" b="1" dirty="0">
-                  <a:solidFill>
-                    <a:srgbClr val="7030A0"/>
-                  </a:solidFill>
-                </a:rPr>
-                <a:t>root node</a:t>
-              </a:r>
-            </a:p>
-          </p:txBody>
-        </p:sp>
-        <p:sp>
-          <p:nvSpPr>
-            <p:cNvPr id="29" name="TextBox 28">
-              <a:extLst>
-                <a:ext uri="{FF2B5EF4-FFF2-40B4-BE49-F238E27FC236}">
-                  <a16:creationId xmlns:a16="http://schemas.microsoft.com/office/drawing/2014/main" id="{E461CE58-3E31-45A4-8F1E-1FFA857F4B1C}"/>
-                </a:ext>
-              </a:extLst>
-            </p:cNvPr>
-            <p:cNvSpPr txBox="1"/>
-            <p:nvPr/>
-          </p:nvSpPr>
-          <p:spPr>
-            <a:xfrm>
-              <a:off x="9579419" y="3965749"/>
-              <a:ext cx="784958" cy="276999"/>
-            </a:xfrm>
-            <a:prstGeom prst="rect">
-              <a:avLst/>
-            </a:prstGeom>
-            <a:noFill/>
-          </p:spPr>
-          <p:txBody>
-            <a:bodyPr wrap="none" rtlCol="0">
-              <a:spAutoFit/>
-            </a:bodyPr>
-            <a:lstStyle/>
-            <a:p>
-              <a:r>
-                <a:rPr lang="en-US" sz="1200" b="1" dirty="0">
-                  <a:solidFill>
-                    <a:schemeClr val="accent6">
-                      <a:lumMod val="75000"/>
-                    </a:schemeClr>
-                  </a:solidFill>
-                </a:rPr>
-                <a:t>leaf node</a:t>
-              </a:r>
-            </a:p>
-          </p:txBody>
-        </p:sp>
-        <p:sp>
-          <p:nvSpPr>
-            <p:cNvPr id="30" name="TextBox 29">
-              <a:extLst>
-                <a:ext uri="{FF2B5EF4-FFF2-40B4-BE49-F238E27FC236}">
-                  <a16:creationId xmlns:a16="http://schemas.microsoft.com/office/drawing/2014/main" id="{B0FD2CD4-701F-4187-9157-8C4832AFDF45}"/>
-                </a:ext>
-              </a:extLst>
-            </p:cNvPr>
-            <p:cNvSpPr txBox="1"/>
-            <p:nvPr/>
-          </p:nvSpPr>
-          <p:spPr>
-            <a:xfrm>
-              <a:off x="9159532" y="3546415"/>
-              <a:ext cx="493981" cy="276999"/>
-            </a:xfrm>
-            <a:prstGeom prst="rect">
-              <a:avLst/>
-            </a:prstGeom>
-            <a:noFill/>
-          </p:spPr>
-          <p:txBody>
-            <a:bodyPr wrap="none" rtlCol="0">
-              <a:spAutoFit/>
-            </a:bodyPr>
-            <a:lstStyle/>
-            <a:p>
-              <a:r>
-                <a:rPr lang="en-US" sz="1200" b="1" dirty="0">
-                  <a:solidFill>
-                    <a:srgbClr val="0070C0"/>
-                  </a:solidFill>
-                </a:rPr>
-                <a:t>edge</a:t>
-              </a:r>
-            </a:p>
-          </p:txBody>
-        </p:sp>
-      </p:grpSp>
-      <p:cxnSp>
-        <p:nvCxnSpPr>
-          <p:cNvPr id="34" name="Connector: Curved 33">
-            <a:extLst>
-              <a:ext uri="{FF2B5EF4-FFF2-40B4-BE49-F238E27FC236}">
-                <a16:creationId xmlns:a16="http://schemas.microsoft.com/office/drawing/2014/main" id="{BB7B31A2-7B41-49B8-B95E-41872A03DCED}"/>
-              </a:ext>
-            </a:extLst>
-          </p:cNvPr>
-          <p:cNvCxnSpPr>
-            <a:cxnSpLocks/>
-            <a:stCxn id="5" idx="4"/>
-            <a:endCxn id="6" idx="0"/>
-          </p:cNvCxnSpPr>
-          <p:nvPr/>
-        </p:nvCxnSpPr>
-        <p:spPr>
-          <a:xfrm rot="16200000" flipH="1">
-            <a:off x="3435222" y="2035268"/>
-            <a:ext cx="232141" cy="1036833"/>
-          </a:xfrm>
-          <a:prstGeom prst="curvedConnector3">
-            <a:avLst>
-              <a:gd name="adj1" fmla="val 50000"/>
-            </a:avLst>
-          </a:prstGeom>
-        </p:spPr>
-        <p:style>
-          <a:lnRef idx="3">
-            <a:schemeClr val="accent1"/>
-          </a:lnRef>
-          <a:fillRef idx="0">
-            <a:schemeClr val="accent1"/>
-          </a:fillRef>
-          <a:effectRef idx="2">
-            <a:schemeClr val="accent1"/>
-          </a:effectRef>
-          <a:fontRef idx="minor">
-            <a:schemeClr val="tx1"/>
-          </a:fontRef>
-        </p:style>
-      </p:cxnSp>
-      <p:sp>
-        <p:nvSpPr>
-          <p:cNvPr id="54" name="TextBox 53">
-            <a:extLst>
-              <a:ext uri="{FF2B5EF4-FFF2-40B4-BE49-F238E27FC236}">
-                <a16:creationId xmlns:a16="http://schemas.microsoft.com/office/drawing/2014/main" id="{5C1C6199-9A68-4AB0-9412-2DCB465B7004}"/>
-              </a:ext>
-            </a:extLst>
-          </p:cNvPr>
-          <p:cNvSpPr txBox="1"/>
-          <p:nvPr/>
-        </p:nvSpPr>
-        <p:spPr>
-          <a:xfrm>
-            <a:off x="4341830" y="2788303"/>
-            <a:ext cx="1047018" cy="276999"/>
-          </a:xfrm>
-          <a:prstGeom prst="rect">
-            <a:avLst/>
-          </a:prstGeom>
-          <a:noFill/>
-        </p:spPr>
-        <p:txBody>
-          <a:bodyPr wrap="none" rtlCol="0">
-            <a:spAutoFit/>
-          </a:bodyPr>
-          <a:lstStyle/>
-          <a:p>
-            <a:r>
-              <a:rPr lang="en-US" sz="1200" b="1" dirty="0">
-                <a:solidFill>
-                  <a:schemeClr val="accent4">
-                    <a:lumMod val="75000"/>
-                  </a:schemeClr>
-                </a:solidFill>
-              </a:rPr>
-              <a:t>internal node</a:t>
-            </a:r>
-          </a:p>
-        </p:txBody>
-      </p:sp>
-      <p:grpSp>
-        <p:nvGrpSpPr>
-          <p:cNvPr id="103" name="Group 102">
-            <a:extLst>
-              <a:ext uri="{FF2B5EF4-FFF2-40B4-BE49-F238E27FC236}">
-                <a16:creationId xmlns:a16="http://schemas.microsoft.com/office/drawing/2014/main" id="{693A5BBD-E50F-451D-AE98-94BDCAA1AA7E}"/>
-              </a:ext>
-            </a:extLst>
-          </p:cNvPr>
-          <p:cNvGrpSpPr/>
-          <p:nvPr/>
-        </p:nvGrpSpPr>
-        <p:grpSpPr>
-          <a:xfrm>
-            <a:off x="7122608" y="1921913"/>
-            <a:ext cx="3759845" cy="1332621"/>
-            <a:chOff x="7122608" y="1895296"/>
-            <a:chExt cx="3759845" cy="1332621"/>
           </a:xfrm>
         </p:grpSpPr>
         <p:grpSp>
           <p:nvGrpSpPr>
-            <p:cNvPr id="77" name="Group 76">
+            <p:cNvPr id="3" name="Group 2">
               <a:extLst>
                 <a:ext uri="{FF2B5EF4-FFF2-40B4-BE49-F238E27FC236}">
-                  <a16:creationId xmlns:a16="http://schemas.microsoft.com/office/drawing/2014/main" id="{C4B1B35B-7BD6-4A3A-9FEB-391A61FC2CD5}"/>
+                  <a16:creationId xmlns:a16="http://schemas.microsoft.com/office/drawing/2014/main" id="{C965A83C-53D4-4377-A49B-60A434DC6C67}"/>
                 </a:ext>
               </a:extLst>
             </p:cNvPr>
@@ -8328,18 +7235,18 @@
           </p:nvGrpSpPr>
           <p:grpSpPr>
             <a:xfrm>
-              <a:off x="7122608" y="1895296"/>
-              <a:ext cx="3276876" cy="1332621"/>
-              <a:chOff x="6576646" y="1503485"/>
-              <a:chExt cx="3276876" cy="1332621"/>
+              <a:off x="1469018" y="1888975"/>
+              <a:ext cx="4107185" cy="2890083"/>
+              <a:chOff x="6257192" y="1503485"/>
+              <a:chExt cx="4107185" cy="2890083"/>
             </a:xfrm>
           </p:grpSpPr>
           <p:sp>
             <p:nvSpPr>
-              <p:cNvPr id="78" name="Oval 77">
+              <p:cNvPr id="5" name="Oval 4">
                 <a:extLst>
                   <a:ext uri="{FF2B5EF4-FFF2-40B4-BE49-F238E27FC236}">
-                    <a16:creationId xmlns:a16="http://schemas.microsoft.com/office/drawing/2014/main" id="{6A3DF219-689D-43C1-89C2-4A8ABA4C19EB}"/>
+                    <a16:creationId xmlns:a16="http://schemas.microsoft.com/office/drawing/2014/main" id="{B62EB648-0EEA-46C4-BC8E-E87D515BEA9F}"/>
                   </a:ext>
                 </a:extLst>
               </p:cNvPr>
@@ -8388,10 +7295,10 @@
           </p:sp>
           <p:sp>
             <p:nvSpPr>
-              <p:cNvPr id="79" name="Oval 78">
+              <p:cNvPr id="6" name="Oval 5">
                 <a:extLst>
                   <a:ext uri="{FF2B5EF4-FFF2-40B4-BE49-F238E27FC236}">
-                    <a16:creationId xmlns:a16="http://schemas.microsoft.com/office/drawing/2014/main" id="{3E4E3EF3-92BF-4D62-9AB0-CA9B39D4E13E}"/>
+                    <a16:creationId xmlns:a16="http://schemas.microsoft.com/office/drawing/2014/main" id="{8128AA59-F316-4B09-8A36-E8CC4D24001D}"/>
                   </a:ext>
                 </a:extLst>
               </p:cNvPr>
@@ -8442,10 +7349,1173 @@
           </p:sp>
           <p:sp>
             <p:nvSpPr>
-              <p:cNvPr id="85" name="Oval 84">
+              <p:cNvPr id="8" name="Oval 7">
                 <a:extLst>
                   <a:ext uri="{FF2B5EF4-FFF2-40B4-BE49-F238E27FC236}">
-                    <a16:creationId xmlns:a16="http://schemas.microsoft.com/office/drawing/2014/main" id="{E41FDE4B-E3B8-4970-B98E-2C7322055242}"/>
+                    <a16:creationId xmlns:a16="http://schemas.microsoft.com/office/drawing/2014/main" id="{75906CA7-B404-420A-959D-082B81569770}"/>
+                  </a:ext>
+                </a:extLst>
+              </p:cNvPr>
+              <p:cNvSpPr/>
+              <p:nvPr/>
+            </p:nvSpPr>
+            <p:spPr>
+              <a:xfrm>
+                <a:off x="8244940" y="3829929"/>
+                <a:ext cx="548640" cy="548640"/>
+              </a:xfrm>
+              <a:prstGeom prst="ellipse">
+                <a:avLst/>
+              </a:prstGeom>
+              <a:ln w="28575">
+                <a:solidFill>
+                  <a:schemeClr val="accent6">
+                    <a:lumMod val="75000"/>
+                  </a:schemeClr>
+                </a:solidFill>
+              </a:ln>
+            </p:spPr>
+            <p:style>
+              <a:lnRef idx="2">
+                <a:schemeClr val="dk1"/>
+              </a:lnRef>
+              <a:fillRef idx="1">
+                <a:schemeClr val="lt1"/>
+              </a:fillRef>
+              <a:effectRef idx="0">
+                <a:schemeClr val="dk1"/>
+              </a:effectRef>
+              <a:fontRef idx="minor">
+                <a:schemeClr val="dk1"/>
+              </a:fontRef>
+            </p:style>
+            <p:txBody>
+              <a:bodyPr rtlCol="0" anchor="ctr"/>
+              <a:lstStyle/>
+              <a:p>
+                <a:pPr algn="ctr"/>
+                <a:r>
+                  <a:rPr lang="en-US" sz="1400" b="1" dirty="0"/>
+                  <a:t>3</a:t>
+                </a:r>
+              </a:p>
+            </p:txBody>
+          </p:sp>
+          <p:sp>
+            <p:nvSpPr>
+              <p:cNvPr id="9" name="Oval 8">
+                <a:extLst>
+                  <a:ext uri="{FF2B5EF4-FFF2-40B4-BE49-F238E27FC236}">
+                    <a16:creationId xmlns:a16="http://schemas.microsoft.com/office/drawing/2014/main" id="{FDF2B421-7336-4961-95DF-59205850B70A}"/>
+                  </a:ext>
+                </a:extLst>
+              </p:cNvPr>
+              <p:cNvSpPr/>
+              <p:nvPr/>
+            </p:nvSpPr>
+            <p:spPr>
+              <a:xfrm>
+                <a:off x="6576646" y="3829929"/>
+                <a:ext cx="548640" cy="548640"/>
+              </a:xfrm>
+              <a:prstGeom prst="ellipse">
+                <a:avLst/>
+              </a:prstGeom>
+              <a:ln w="28575">
+                <a:solidFill>
+                  <a:schemeClr val="accent6">
+                    <a:lumMod val="75000"/>
+                  </a:schemeClr>
+                </a:solidFill>
+              </a:ln>
+            </p:spPr>
+            <p:style>
+              <a:lnRef idx="2">
+                <a:schemeClr val="dk1"/>
+              </a:lnRef>
+              <a:fillRef idx="1">
+                <a:schemeClr val="lt1"/>
+              </a:fillRef>
+              <a:effectRef idx="0">
+                <a:schemeClr val="dk1"/>
+              </a:effectRef>
+              <a:fontRef idx="minor">
+                <a:schemeClr val="dk1"/>
+              </a:fontRef>
+            </p:style>
+            <p:txBody>
+              <a:bodyPr rtlCol="0" anchor="ctr"/>
+              <a:lstStyle/>
+              <a:p>
+                <a:pPr algn="ctr"/>
+                <a:r>
+                  <a:rPr lang="en-US" sz="1400" b="1" dirty="0"/>
+                  <a:t>5</a:t>
+                </a:r>
+              </a:p>
+            </p:txBody>
+          </p:sp>
+          <p:sp>
+            <p:nvSpPr>
+              <p:cNvPr id="10" name="Oval 9">
+                <a:extLst>
+                  <a:ext uri="{FF2B5EF4-FFF2-40B4-BE49-F238E27FC236}">
+                    <a16:creationId xmlns:a16="http://schemas.microsoft.com/office/drawing/2014/main" id="{0A978841-CEB8-4B13-892F-74878DF066FB}"/>
+                  </a:ext>
+                </a:extLst>
+              </p:cNvPr>
+              <p:cNvSpPr/>
+              <p:nvPr/>
+            </p:nvSpPr>
+            <p:spPr>
+              <a:xfrm>
+                <a:off x="7186245" y="3829929"/>
+                <a:ext cx="548640" cy="548640"/>
+              </a:xfrm>
+              <a:prstGeom prst="ellipse">
+                <a:avLst/>
+              </a:prstGeom>
+              <a:ln w="28575">
+                <a:solidFill>
+                  <a:schemeClr val="accent6">
+                    <a:lumMod val="75000"/>
+                  </a:schemeClr>
+                </a:solidFill>
+              </a:ln>
+            </p:spPr>
+            <p:style>
+              <a:lnRef idx="2">
+                <a:schemeClr val="dk1"/>
+              </a:lnRef>
+              <a:fillRef idx="1">
+                <a:schemeClr val="lt1"/>
+              </a:fillRef>
+              <a:effectRef idx="0">
+                <a:schemeClr val="dk1"/>
+              </a:effectRef>
+              <a:fontRef idx="minor">
+                <a:schemeClr val="dk1"/>
+              </a:fontRef>
+            </p:style>
+            <p:txBody>
+              <a:bodyPr rtlCol="0" anchor="ctr"/>
+              <a:lstStyle/>
+              <a:p>
+                <a:pPr algn="ctr"/>
+                <a:r>
+                  <a:rPr lang="en-US" sz="1400" b="1" dirty="0"/>
+                  <a:t>10</a:t>
+                </a:r>
+              </a:p>
+            </p:txBody>
+          </p:sp>
+          <p:sp>
+            <p:nvSpPr>
+              <p:cNvPr id="11" name="Oval 10">
+                <a:extLst>
+                  <a:ext uri="{FF2B5EF4-FFF2-40B4-BE49-F238E27FC236}">
+                    <a16:creationId xmlns:a16="http://schemas.microsoft.com/office/drawing/2014/main" id="{FF3D7E7E-D3C5-48E8-B266-69D476B120C3}"/>
+                  </a:ext>
+                </a:extLst>
+              </p:cNvPr>
+              <p:cNvSpPr/>
+              <p:nvPr/>
+            </p:nvSpPr>
+            <p:spPr>
+              <a:xfrm>
+                <a:off x="8917661" y="3844928"/>
+                <a:ext cx="548640" cy="548640"/>
+              </a:xfrm>
+              <a:prstGeom prst="ellipse">
+                <a:avLst/>
+              </a:prstGeom>
+              <a:ln w="28575">
+                <a:solidFill>
+                  <a:schemeClr val="accent6">
+                    <a:lumMod val="75000"/>
+                  </a:schemeClr>
+                </a:solidFill>
+              </a:ln>
+            </p:spPr>
+            <p:style>
+              <a:lnRef idx="2">
+                <a:schemeClr val="dk1"/>
+              </a:lnRef>
+              <a:fillRef idx="1">
+                <a:schemeClr val="lt1"/>
+              </a:fillRef>
+              <a:effectRef idx="0">
+                <a:schemeClr val="dk1"/>
+              </a:effectRef>
+              <a:fontRef idx="minor">
+                <a:schemeClr val="dk1"/>
+              </a:fontRef>
+            </p:style>
+            <p:txBody>
+              <a:bodyPr rtlCol="0" anchor="ctr"/>
+              <a:lstStyle/>
+              <a:p>
+                <a:pPr algn="ctr"/>
+                <a:r>
+                  <a:rPr lang="en-US" sz="1400" b="1" dirty="0"/>
+                  <a:t>4</a:t>
+                </a:r>
+              </a:p>
+            </p:txBody>
+          </p:sp>
+          <p:sp>
+            <p:nvSpPr>
+              <p:cNvPr id="12" name="Oval 11">
+                <a:extLst>
+                  <a:ext uri="{FF2B5EF4-FFF2-40B4-BE49-F238E27FC236}">
+                    <a16:creationId xmlns:a16="http://schemas.microsoft.com/office/drawing/2014/main" id="{6311040C-2E5E-46AE-A584-2EA130EBCCB7}"/>
+                  </a:ext>
+                </a:extLst>
+              </p:cNvPr>
+              <p:cNvSpPr/>
+              <p:nvPr/>
+            </p:nvSpPr>
+            <p:spPr>
+              <a:xfrm>
+                <a:off x="6901961" y="3006969"/>
+                <a:ext cx="548640" cy="548640"/>
+              </a:xfrm>
+              <a:prstGeom prst="ellipse">
+                <a:avLst/>
+              </a:prstGeom>
+              <a:ln w="19050">
+                <a:solidFill>
+                  <a:schemeClr val="accent4">
+                    <a:lumMod val="75000"/>
+                  </a:schemeClr>
+                </a:solidFill>
+              </a:ln>
+            </p:spPr>
+            <p:style>
+              <a:lnRef idx="2">
+                <a:schemeClr val="dk1"/>
+              </a:lnRef>
+              <a:fillRef idx="1">
+                <a:schemeClr val="lt1"/>
+              </a:fillRef>
+              <a:effectRef idx="0">
+                <a:schemeClr val="dk1"/>
+              </a:effectRef>
+              <a:fontRef idx="minor">
+                <a:schemeClr val="dk1"/>
+              </a:fontRef>
+            </p:style>
+            <p:txBody>
+              <a:bodyPr rtlCol="0" anchor="ctr"/>
+              <a:lstStyle/>
+              <a:p>
+                <a:pPr algn="ctr"/>
+                <a:r>
+                  <a:rPr lang="en-US" sz="1400" b="1" dirty="0"/>
+                  <a:t>6</a:t>
+                </a:r>
+              </a:p>
+            </p:txBody>
+          </p:sp>
+          <p:sp>
+            <p:nvSpPr>
+              <p:cNvPr id="13" name="Oval 12">
+                <a:extLst>
+                  <a:ext uri="{FF2B5EF4-FFF2-40B4-BE49-F238E27FC236}">
+                    <a16:creationId xmlns:a16="http://schemas.microsoft.com/office/drawing/2014/main" id="{DC6887E2-F520-43DF-A704-573BA34256DD}"/>
+                  </a:ext>
+                </a:extLst>
+              </p:cNvPr>
+              <p:cNvSpPr/>
+              <p:nvPr/>
+            </p:nvSpPr>
+            <p:spPr>
+              <a:xfrm>
+                <a:off x="6576646" y="2287466"/>
+                <a:ext cx="548640" cy="548640"/>
+              </a:xfrm>
+              <a:prstGeom prst="ellipse">
+                <a:avLst/>
+              </a:prstGeom>
+              <a:ln w="19050">
+                <a:solidFill>
+                  <a:schemeClr val="accent4">
+                    <a:lumMod val="75000"/>
+                  </a:schemeClr>
+                </a:solidFill>
+              </a:ln>
+            </p:spPr>
+            <p:style>
+              <a:lnRef idx="2">
+                <a:schemeClr val="dk1"/>
+              </a:lnRef>
+              <a:fillRef idx="1">
+                <a:schemeClr val="lt1"/>
+              </a:fillRef>
+              <a:effectRef idx="0">
+                <a:schemeClr val="dk1"/>
+              </a:effectRef>
+              <a:fontRef idx="minor">
+                <a:schemeClr val="dk1"/>
+              </a:fontRef>
+            </p:style>
+            <p:txBody>
+              <a:bodyPr rtlCol="0" anchor="ctr"/>
+              <a:lstStyle/>
+              <a:p>
+                <a:pPr algn="ctr"/>
+                <a:r>
+                  <a:rPr lang="en-US" sz="1400" b="1" dirty="0"/>
+                  <a:t>7</a:t>
+                </a:r>
+              </a:p>
+            </p:txBody>
+          </p:sp>
+          <p:sp>
+            <p:nvSpPr>
+              <p:cNvPr id="14" name="Oval 13">
+                <a:extLst>
+                  <a:ext uri="{FF2B5EF4-FFF2-40B4-BE49-F238E27FC236}">
+                    <a16:creationId xmlns:a16="http://schemas.microsoft.com/office/drawing/2014/main" id="{61596B00-0D0B-43E3-A71E-3003CF6D643A}"/>
+                  </a:ext>
+                </a:extLst>
+              </p:cNvPr>
+              <p:cNvSpPr/>
+              <p:nvPr/>
+            </p:nvSpPr>
+            <p:spPr>
+              <a:xfrm>
+                <a:off x="8583563" y="3006969"/>
+                <a:ext cx="548640" cy="548640"/>
+              </a:xfrm>
+              <a:prstGeom prst="ellipse">
+                <a:avLst/>
+              </a:prstGeom>
+              <a:ln w="19050">
+                <a:solidFill>
+                  <a:schemeClr val="accent4">
+                    <a:lumMod val="75000"/>
+                  </a:schemeClr>
+                </a:solidFill>
+              </a:ln>
+            </p:spPr>
+            <p:style>
+              <a:lnRef idx="2">
+                <a:schemeClr val="dk1"/>
+              </a:lnRef>
+              <a:fillRef idx="1">
+                <a:schemeClr val="lt1"/>
+              </a:fillRef>
+              <a:effectRef idx="0">
+                <a:schemeClr val="dk1"/>
+              </a:effectRef>
+              <a:fontRef idx="minor">
+                <a:schemeClr val="dk1"/>
+              </a:fontRef>
+            </p:style>
+            <p:txBody>
+              <a:bodyPr rtlCol="0" anchor="ctr"/>
+              <a:lstStyle/>
+              <a:p>
+                <a:pPr algn="ctr"/>
+                <a:r>
+                  <a:rPr lang="en-US" sz="1400" b="1" dirty="0"/>
+                  <a:t>8</a:t>
+                </a:r>
+              </a:p>
+            </p:txBody>
+          </p:sp>
+          <p:sp>
+            <p:nvSpPr>
+              <p:cNvPr id="16" name="Oval 15">
+                <a:extLst>
+                  <a:ext uri="{FF2B5EF4-FFF2-40B4-BE49-F238E27FC236}">
+                    <a16:creationId xmlns:a16="http://schemas.microsoft.com/office/drawing/2014/main" id="{9A24B021-A0D2-4069-863D-93EEC94569A4}"/>
+                  </a:ext>
+                </a:extLst>
+              </p:cNvPr>
+              <p:cNvSpPr/>
+              <p:nvPr/>
+            </p:nvSpPr>
+            <p:spPr>
+              <a:xfrm>
+                <a:off x="6257192" y="3006969"/>
+                <a:ext cx="548640" cy="548640"/>
+              </a:xfrm>
+              <a:prstGeom prst="ellipse">
+                <a:avLst/>
+              </a:prstGeom>
+              <a:ln w="28575">
+                <a:solidFill>
+                  <a:schemeClr val="accent6">
+                    <a:lumMod val="75000"/>
+                  </a:schemeClr>
+                </a:solidFill>
+              </a:ln>
+            </p:spPr>
+            <p:style>
+              <a:lnRef idx="2">
+                <a:schemeClr val="dk1"/>
+              </a:lnRef>
+              <a:fillRef idx="1">
+                <a:schemeClr val="lt1"/>
+              </a:fillRef>
+              <a:effectRef idx="0">
+                <a:schemeClr val="dk1"/>
+              </a:effectRef>
+              <a:fontRef idx="minor">
+                <a:schemeClr val="dk1"/>
+              </a:fontRef>
+            </p:style>
+            <p:txBody>
+              <a:bodyPr rtlCol="0" anchor="ctr"/>
+              <a:lstStyle/>
+              <a:p>
+                <a:pPr algn="ctr"/>
+                <a:r>
+                  <a:rPr lang="en-US" sz="1400" b="1" dirty="0"/>
+                  <a:t>1</a:t>
+                </a:r>
+              </a:p>
+            </p:txBody>
+          </p:sp>
+          <p:cxnSp>
+            <p:nvCxnSpPr>
+              <p:cNvPr id="18" name="Connector: Curved 17">
+                <a:extLst>
+                  <a:ext uri="{FF2B5EF4-FFF2-40B4-BE49-F238E27FC236}">
+                    <a16:creationId xmlns:a16="http://schemas.microsoft.com/office/drawing/2014/main" id="{CFBA7BB1-36B3-41A5-87C2-28F6B30BDF07}"/>
+                  </a:ext>
+                </a:extLst>
+              </p:cNvPr>
+              <p:cNvCxnSpPr>
+                <a:cxnSpLocks/>
+                <a:stCxn id="5" idx="4"/>
+                <a:endCxn id="13" idx="0"/>
+              </p:cNvCxnSpPr>
+              <p:nvPr/>
+            </p:nvCxnSpPr>
+            <p:spPr>
+              <a:xfrm rot="5400000">
+                <a:off x="7218338" y="1684753"/>
+                <a:ext cx="235341" cy="970084"/>
+              </a:xfrm>
+              <a:prstGeom prst="curvedConnector3">
+                <a:avLst>
+                  <a:gd name="adj1" fmla="val 50000"/>
+                </a:avLst>
+              </a:prstGeom>
+            </p:spPr>
+            <p:style>
+              <a:lnRef idx="3">
+                <a:schemeClr val="accent1"/>
+              </a:lnRef>
+              <a:fillRef idx="0">
+                <a:schemeClr val="accent1"/>
+              </a:fillRef>
+              <a:effectRef idx="2">
+                <a:schemeClr val="accent1"/>
+              </a:effectRef>
+              <a:fontRef idx="minor">
+                <a:schemeClr val="tx1"/>
+              </a:fontRef>
+            </p:style>
+          </p:cxnSp>
+          <p:cxnSp>
+            <p:nvCxnSpPr>
+              <p:cNvPr id="19" name="Connector: Curved 18">
+                <a:extLst>
+                  <a:ext uri="{FF2B5EF4-FFF2-40B4-BE49-F238E27FC236}">
+                    <a16:creationId xmlns:a16="http://schemas.microsoft.com/office/drawing/2014/main" id="{3002A634-AFFA-4FFF-A40B-C4AD3067757D}"/>
+                  </a:ext>
+                </a:extLst>
+              </p:cNvPr>
+              <p:cNvCxnSpPr>
+                <a:cxnSpLocks/>
+                <a:stCxn id="13" idx="4"/>
+                <a:endCxn id="12" idx="0"/>
+              </p:cNvCxnSpPr>
+              <p:nvPr/>
+            </p:nvCxnSpPr>
+            <p:spPr>
+              <a:xfrm rot="16200000" flipH="1">
+                <a:off x="6928192" y="2758879"/>
+                <a:ext cx="170863" cy="325315"/>
+              </a:xfrm>
+              <a:prstGeom prst="curvedConnector3">
+                <a:avLst/>
+              </a:prstGeom>
+            </p:spPr>
+            <p:style>
+              <a:lnRef idx="3">
+                <a:schemeClr val="accent1"/>
+              </a:lnRef>
+              <a:fillRef idx="0">
+                <a:schemeClr val="accent1"/>
+              </a:fillRef>
+              <a:effectRef idx="2">
+                <a:schemeClr val="accent1"/>
+              </a:effectRef>
+              <a:fontRef idx="minor">
+                <a:schemeClr val="tx1"/>
+              </a:fontRef>
+            </p:style>
+          </p:cxnSp>
+          <p:cxnSp>
+            <p:nvCxnSpPr>
+              <p:cNvPr id="20" name="Connector: Curved 19">
+                <a:extLst>
+                  <a:ext uri="{FF2B5EF4-FFF2-40B4-BE49-F238E27FC236}">
+                    <a16:creationId xmlns:a16="http://schemas.microsoft.com/office/drawing/2014/main" id="{C64F6F2F-20FD-4BBF-8B96-63804EB7F55C}"/>
+                  </a:ext>
+                </a:extLst>
+              </p:cNvPr>
+              <p:cNvCxnSpPr>
+                <a:cxnSpLocks/>
+                <a:stCxn id="13" idx="4"/>
+                <a:endCxn id="16" idx="0"/>
+              </p:cNvCxnSpPr>
+              <p:nvPr/>
+            </p:nvCxnSpPr>
+            <p:spPr>
+              <a:xfrm rot="5400000">
+                <a:off x="6605808" y="2761810"/>
+                <a:ext cx="170863" cy="319454"/>
+              </a:xfrm>
+              <a:prstGeom prst="curvedConnector3">
+                <a:avLst>
+                  <a:gd name="adj1" fmla="val 50000"/>
+                </a:avLst>
+              </a:prstGeom>
+            </p:spPr>
+            <p:style>
+              <a:lnRef idx="3">
+                <a:schemeClr val="accent1"/>
+              </a:lnRef>
+              <a:fillRef idx="0">
+                <a:schemeClr val="accent1"/>
+              </a:fillRef>
+              <a:effectRef idx="2">
+                <a:schemeClr val="accent1"/>
+              </a:effectRef>
+              <a:fontRef idx="minor">
+                <a:schemeClr val="tx1"/>
+              </a:fontRef>
+            </p:style>
+          </p:cxnSp>
+          <p:cxnSp>
+            <p:nvCxnSpPr>
+              <p:cNvPr id="21" name="Connector: Curved 20">
+                <a:extLst>
+                  <a:ext uri="{FF2B5EF4-FFF2-40B4-BE49-F238E27FC236}">
+                    <a16:creationId xmlns:a16="http://schemas.microsoft.com/office/drawing/2014/main" id="{1B3AF1F9-F77E-4F99-8F8B-A881EE1FA49B}"/>
+                  </a:ext>
+                </a:extLst>
+              </p:cNvPr>
+              <p:cNvCxnSpPr>
+                <a:cxnSpLocks/>
+                <a:stCxn id="12" idx="4"/>
+                <a:endCxn id="9" idx="0"/>
+              </p:cNvCxnSpPr>
+              <p:nvPr/>
+            </p:nvCxnSpPr>
+            <p:spPr>
+              <a:xfrm rot="5400000">
+                <a:off x="6876464" y="3530112"/>
+                <a:ext cx="274320" cy="325315"/>
+              </a:xfrm>
+              <a:prstGeom prst="curvedConnector3">
+                <a:avLst>
+                  <a:gd name="adj1" fmla="val 50000"/>
+                </a:avLst>
+              </a:prstGeom>
+            </p:spPr>
+            <p:style>
+              <a:lnRef idx="3">
+                <a:schemeClr val="accent1"/>
+              </a:lnRef>
+              <a:fillRef idx="0">
+                <a:schemeClr val="accent1"/>
+              </a:fillRef>
+              <a:effectRef idx="2">
+                <a:schemeClr val="accent1"/>
+              </a:effectRef>
+              <a:fontRef idx="minor">
+                <a:schemeClr val="tx1"/>
+              </a:fontRef>
+            </p:style>
+          </p:cxnSp>
+          <p:cxnSp>
+            <p:nvCxnSpPr>
+              <p:cNvPr id="22" name="Connector: Curved 21">
+                <a:extLst>
+                  <a:ext uri="{FF2B5EF4-FFF2-40B4-BE49-F238E27FC236}">
+                    <a16:creationId xmlns:a16="http://schemas.microsoft.com/office/drawing/2014/main" id="{4A507AF4-F3B9-4353-BF1A-78BAA3E4ADE8}"/>
+                  </a:ext>
+                </a:extLst>
+              </p:cNvPr>
+              <p:cNvCxnSpPr>
+                <a:cxnSpLocks/>
+                <a:stCxn id="12" idx="4"/>
+                <a:endCxn id="10" idx="0"/>
+              </p:cNvCxnSpPr>
+              <p:nvPr/>
+            </p:nvCxnSpPr>
+            <p:spPr>
+              <a:xfrm rot="16200000" flipH="1">
+                <a:off x="7181263" y="3550627"/>
+                <a:ext cx="274320" cy="284284"/>
+              </a:xfrm>
+              <a:prstGeom prst="curvedConnector3">
+                <a:avLst>
+                  <a:gd name="adj1" fmla="val 50000"/>
+                </a:avLst>
+              </a:prstGeom>
+            </p:spPr>
+            <p:style>
+              <a:lnRef idx="3">
+                <a:schemeClr val="accent1"/>
+              </a:lnRef>
+              <a:fillRef idx="0">
+                <a:schemeClr val="accent1"/>
+              </a:fillRef>
+              <a:effectRef idx="2">
+                <a:schemeClr val="accent1"/>
+              </a:effectRef>
+              <a:fontRef idx="minor">
+                <a:schemeClr val="tx1"/>
+              </a:fontRef>
+            </p:style>
+          </p:cxnSp>
+          <p:cxnSp>
+            <p:nvCxnSpPr>
+              <p:cNvPr id="23" name="Connector: Curved 22">
+                <a:extLst>
+                  <a:ext uri="{FF2B5EF4-FFF2-40B4-BE49-F238E27FC236}">
+                    <a16:creationId xmlns:a16="http://schemas.microsoft.com/office/drawing/2014/main" id="{30BC02C4-1BB9-4B2A-B078-84DEB68681D5}"/>
+                  </a:ext>
+                </a:extLst>
+              </p:cNvPr>
+              <p:cNvCxnSpPr>
+                <a:cxnSpLocks/>
+                <a:stCxn id="14" idx="4"/>
+                <a:endCxn id="8" idx="0"/>
+              </p:cNvCxnSpPr>
+              <p:nvPr/>
+            </p:nvCxnSpPr>
+            <p:spPr>
+              <a:xfrm rot="5400000">
+                <a:off x="8551412" y="3523458"/>
+                <a:ext cx="274320" cy="338623"/>
+              </a:xfrm>
+              <a:prstGeom prst="curvedConnector3">
+                <a:avLst>
+                  <a:gd name="adj1" fmla="val 50000"/>
+                </a:avLst>
+              </a:prstGeom>
+            </p:spPr>
+            <p:style>
+              <a:lnRef idx="3">
+                <a:schemeClr val="accent1"/>
+              </a:lnRef>
+              <a:fillRef idx="0">
+                <a:schemeClr val="accent1"/>
+              </a:fillRef>
+              <a:effectRef idx="2">
+                <a:schemeClr val="accent1"/>
+              </a:effectRef>
+              <a:fontRef idx="minor">
+                <a:schemeClr val="tx1"/>
+              </a:fontRef>
+            </p:style>
+          </p:cxnSp>
+          <p:cxnSp>
+            <p:nvCxnSpPr>
+              <p:cNvPr id="24" name="Connector: Curved 23">
+                <a:extLst>
+                  <a:ext uri="{FF2B5EF4-FFF2-40B4-BE49-F238E27FC236}">
+                    <a16:creationId xmlns:a16="http://schemas.microsoft.com/office/drawing/2014/main" id="{30638E03-9D54-437C-9AAD-07136FCB0FC4}"/>
+                  </a:ext>
+                </a:extLst>
+              </p:cNvPr>
+              <p:cNvCxnSpPr>
+                <a:cxnSpLocks/>
+                <a:stCxn id="14" idx="4"/>
+                <a:endCxn id="11" idx="0"/>
+              </p:cNvCxnSpPr>
+              <p:nvPr/>
+            </p:nvCxnSpPr>
+            <p:spPr>
+              <a:xfrm rot="16200000" flipH="1">
+                <a:off x="8880273" y="3533219"/>
+                <a:ext cx="289319" cy="334098"/>
+              </a:xfrm>
+              <a:prstGeom prst="curvedConnector3">
+                <a:avLst>
+                  <a:gd name="adj1" fmla="val 50000"/>
+                </a:avLst>
+              </a:prstGeom>
+            </p:spPr>
+            <p:style>
+              <a:lnRef idx="3">
+                <a:schemeClr val="accent1"/>
+              </a:lnRef>
+              <a:fillRef idx="0">
+                <a:schemeClr val="accent1"/>
+              </a:fillRef>
+              <a:effectRef idx="2">
+                <a:schemeClr val="accent1"/>
+              </a:effectRef>
+              <a:fontRef idx="minor">
+                <a:schemeClr val="tx1"/>
+              </a:fontRef>
+            </p:style>
+          </p:cxnSp>
+          <p:cxnSp>
+            <p:nvCxnSpPr>
+              <p:cNvPr id="26" name="Straight Connector 25">
+                <a:extLst>
+                  <a:ext uri="{FF2B5EF4-FFF2-40B4-BE49-F238E27FC236}">
+                    <a16:creationId xmlns:a16="http://schemas.microsoft.com/office/drawing/2014/main" id="{D39B932B-4BCA-481D-AD94-44E691F719BD}"/>
+                  </a:ext>
+                </a:extLst>
+              </p:cNvPr>
+              <p:cNvCxnSpPr>
+                <a:cxnSpLocks/>
+                <a:stCxn id="6" idx="4"/>
+                <a:endCxn id="14" idx="0"/>
+              </p:cNvCxnSpPr>
+              <p:nvPr/>
+            </p:nvCxnSpPr>
+            <p:spPr>
+              <a:xfrm>
+                <a:off x="8857883" y="2832906"/>
+                <a:ext cx="0" cy="174063"/>
+              </a:xfrm>
+              <a:prstGeom prst="line">
+                <a:avLst/>
+              </a:prstGeom>
+            </p:spPr>
+            <p:style>
+              <a:lnRef idx="3">
+                <a:schemeClr val="accent1"/>
+              </a:lnRef>
+              <a:fillRef idx="0">
+                <a:schemeClr val="accent1"/>
+              </a:fillRef>
+              <a:effectRef idx="2">
+                <a:schemeClr val="accent1"/>
+              </a:effectRef>
+              <a:fontRef idx="minor">
+                <a:schemeClr val="tx1"/>
+              </a:fontRef>
+            </p:style>
+          </p:cxnSp>
+          <p:sp>
+            <p:nvSpPr>
+              <p:cNvPr id="28" name="TextBox 27">
+                <a:extLst>
+                  <a:ext uri="{FF2B5EF4-FFF2-40B4-BE49-F238E27FC236}">
+                    <a16:creationId xmlns:a16="http://schemas.microsoft.com/office/drawing/2014/main" id="{DF35320D-638B-4E3F-A22B-F07B09C58652}"/>
+                  </a:ext>
+                </a:extLst>
+              </p:cNvPr>
+              <p:cNvSpPr txBox="1"/>
+              <p:nvPr/>
+            </p:nvSpPr>
+            <p:spPr>
+              <a:xfrm>
+                <a:off x="8109660" y="1617030"/>
+                <a:ext cx="819199" cy="276999"/>
+              </a:xfrm>
+              <a:prstGeom prst="rect">
+                <a:avLst/>
+              </a:prstGeom>
+              <a:noFill/>
+            </p:spPr>
+            <p:txBody>
+              <a:bodyPr wrap="none" rtlCol="0">
+                <a:spAutoFit/>
+              </a:bodyPr>
+              <a:lstStyle/>
+              <a:p>
+                <a:r>
+                  <a:rPr lang="en-US" sz="1200" b="1" dirty="0">
+                    <a:solidFill>
+                      <a:srgbClr val="7030A0"/>
+                    </a:solidFill>
+                  </a:rPr>
+                  <a:t>root node</a:t>
+                </a:r>
+              </a:p>
+            </p:txBody>
+          </p:sp>
+          <p:sp>
+            <p:nvSpPr>
+              <p:cNvPr id="29" name="TextBox 28">
+                <a:extLst>
+                  <a:ext uri="{FF2B5EF4-FFF2-40B4-BE49-F238E27FC236}">
+                    <a16:creationId xmlns:a16="http://schemas.microsoft.com/office/drawing/2014/main" id="{E461CE58-3E31-45A4-8F1E-1FFA857F4B1C}"/>
+                  </a:ext>
+                </a:extLst>
+              </p:cNvPr>
+              <p:cNvSpPr txBox="1"/>
+              <p:nvPr/>
+            </p:nvSpPr>
+            <p:spPr>
+              <a:xfrm>
+                <a:off x="9579419" y="3965749"/>
+                <a:ext cx="784958" cy="276999"/>
+              </a:xfrm>
+              <a:prstGeom prst="rect">
+                <a:avLst/>
+              </a:prstGeom>
+              <a:noFill/>
+            </p:spPr>
+            <p:txBody>
+              <a:bodyPr wrap="none" rtlCol="0">
+                <a:spAutoFit/>
+              </a:bodyPr>
+              <a:lstStyle/>
+              <a:p>
+                <a:r>
+                  <a:rPr lang="en-US" sz="1200" b="1" dirty="0">
+                    <a:solidFill>
+                      <a:schemeClr val="accent6">
+                        <a:lumMod val="75000"/>
+                      </a:schemeClr>
+                    </a:solidFill>
+                  </a:rPr>
+                  <a:t>leaf node</a:t>
+                </a:r>
+              </a:p>
+            </p:txBody>
+          </p:sp>
+          <p:sp>
+            <p:nvSpPr>
+              <p:cNvPr id="30" name="TextBox 29">
+                <a:extLst>
+                  <a:ext uri="{FF2B5EF4-FFF2-40B4-BE49-F238E27FC236}">
+                    <a16:creationId xmlns:a16="http://schemas.microsoft.com/office/drawing/2014/main" id="{B0FD2CD4-701F-4187-9157-8C4832AFDF45}"/>
+                  </a:ext>
+                </a:extLst>
+              </p:cNvPr>
+              <p:cNvSpPr txBox="1"/>
+              <p:nvPr/>
+            </p:nvSpPr>
+            <p:spPr>
+              <a:xfrm>
+                <a:off x="9159532" y="3546415"/>
+                <a:ext cx="493981" cy="276999"/>
+              </a:xfrm>
+              <a:prstGeom prst="rect">
+                <a:avLst/>
+              </a:prstGeom>
+              <a:noFill/>
+            </p:spPr>
+            <p:txBody>
+              <a:bodyPr wrap="none" rtlCol="0">
+                <a:spAutoFit/>
+              </a:bodyPr>
+              <a:lstStyle/>
+              <a:p>
+                <a:r>
+                  <a:rPr lang="en-US" sz="1200" b="1" dirty="0">
+                    <a:solidFill>
+                      <a:srgbClr val="0070C0"/>
+                    </a:solidFill>
+                  </a:rPr>
+                  <a:t>edge</a:t>
+                </a:r>
+              </a:p>
+            </p:txBody>
+          </p:sp>
+        </p:grpSp>
+        <p:cxnSp>
+          <p:nvCxnSpPr>
+            <p:cNvPr id="34" name="Connector: Curved 33">
+              <a:extLst>
+                <a:ext uri="{FF2B5EF4-FFF2-40B4-BE49-F238E27FC236}">
+                  <a16:creationId xmlns:a16="http://schemas.microsoft.com/office/drawing/2014/main" id="{BB7B31A2-7B41-49B8-B95E-41872A03DCED}"/>
+                </a:ext>
+              </a:extLst>
+            </p:cNvPr>
+            <p:cNvCxnSpPr>
+              <a:cxnSpLocks/>
+              <a:stCxn id="5" idx="4"/>
+              <a:endCxn id="6" idx="0"/>
+            </p:cNvCxnSpPr>
+            <p:nvPr/>
+          </p:nvCxnSpPr>
+          <p:spPr>
+            <a:xfrm rot="16200000" flipH="1">
+              <a:off x="3435222" y="2035268"/>
+              <a:ext cx="232141" cy="1036833"/>
+            </a:xfrm>
+            <a:prstGeom prst="curvedConnector3">
+              <a:avLst>
+                <a:gd name="adj1" fmla="val 50000"/>
+              </a:avLst>
+            </a:prstGeom>
+          </p:spPr>
+          <p:style>
+            <a:lnRef idx="3">
+              <a:schemeClr val="accent1"/>
+            </a:lnRef>
+            <a:fillRef idx="0">
+              <a:schemeClr val="accent1"/>
+            </a:fillRef>
+            <a:effectRef idx="2">
+              <a:schemeClr val="accent1"/>
+            </a:effectRef>
+            <a:fontRef idx="minor">
+              <a:schemeClr val="tx1"/>
+            </a:fontRef>
+          </p:style>
+        </p:cxnSp>
+        <p:sp>
+          <p:nvSpPr>
+            <p:cNvPr id="54" name="TextBox 53">
+              <a:extLst>
+                <a:ext uri="{FF2B5EF4-FFF2-40B4-BE49-F238E27FC236}">
+                  <a16:creationId xmlns:a16="http://schemas.microsoft.com/office/drawing/2014/main" id="{5C1C6199-9A68-4AB0-9412-2DCB465B7004}"/>
+                </a:ext>
+              </a:extLst>
+            </p:cNvPr>
+            <p:cNvSpPr txBox="1"/>
+            <p:nvPr/>
+          </p:nvSpPr>
+          <p:spPr>
+            <a:xfrm>
+              <a:off x="4341830" y="2788303"/>
+              <a:ext cx="1047018" cy="276999"/>
+            </a:xfrm>
+            <a:prstGeom prst="rect">
+              <a:avLst/>
+            </a:prstGeom>
+            <a:noFill/>
+          </p:spPr>
+          <p:txBody>
+            <a:bodyPr wrap="none" rtlCol="0">
+              <a:spAutoFit/>
+            </a:bodyPr>
+            <a:lstStyle/>
+            <a:p>
+              <a:r>
+                <a:rPr lang="en-US" sz="1200" b="1" dirty="0">
+                  <a:solidFill>
+                    <a:schemeClr val="accent4">
+                      <a:lumMod val="75000"/>
+                    </a:schemeClr>
+                  </a:solidFill>
+                </a:rPr>
+                <a:t>internal node</a:t>
+              </a:r>
+            </a:p>
+          </p:txBody>
+        </p:sp>
+      </p:grpSp>
+      <p:sp>
+        <p:nvSpPr>
+          <p:cNvPr id="104" name="TextBox 103">
+            <a:extLst>
+              <a:ext uri="{FF2B5EF4-FFF2-40B4-BE49-F238E27FC236}">
+                <a16:creationId xmlns:a16="http://schemas.microsoft.com/office/drawing/2014/main" id="{112F57C8-22BE-425C-8327-CBDB53206FD4}"/>
+              </a:ext>
+            </a:extLst>
+          </p:cNvPr>
+          <p:cNvSpPr txBox="1"/>
+          <p:nvPr/>
+        </p:nvSpPr>
+        <p:spPr>
+          <a:xfrm>
+            <a:off x="7847276" y="2975498"/>
+            <a:ext cx="1170513" cy="276999"/>
+          </a:xfrm>
+          <a:prstGeom prst="rect">
+            <a:avLst/>
+          </a:prstGeom>
+          <a:noFill/>
+        </p:spPr>
+        <p:txBody>
+          <a:bodyPr wrap="none" rtlCol="0">
+            <a:spAutoFit/>
+          </a:bodyPr>
+          <a:lstStyle/>
+          <a:p>
+            <a:r>
+              <a:rPr lang="en-US" sz="1200" b="1" dirty="0">
+                <a:solidFill>
+                  <a:schemeClr val="accent4">
+                    <a:lumMod val="75000"/>
+                  </a:schemeClr>
+                </a:solidFill>
+              </a:rPr>
+              <a:t>child node of </a:t>
+            </a:r>
+            <a:r>
+              <a:rPr lang="en-US" sz="1200" b="1" dirty="0">
+                <a:solidFill>
+                  <a:srgbClr val="7030A0"/>
+                </a:solidFill>
+              </a:rPr>
+              <a:t>2</a:t>
+            </a:r>
+          </a:p>
+        </p:txBody>
+      </p:sp>
+      <p:grpSp>
+        <p:nvGrpSpPr>
+          <p:cNvPr id="105" name="Group 104">
+            <a:extLst>
+              <a:ext uri="{FF2B5EF4-FFF2-40B4-BE49-F238E27FC236}">
+                <a16:creationId xmlns:a16="http://schemas.microsoft.com/office/drawing/2014/main" id="{44945113-5B46-463F-99BB-AF1BECED7460}"/>
+              </a:ext>
+            </a:extLst>
+          </p:cNvPr>
+          <p:cNvGrpSpPr/>
+          <p:nvPr/>
+        </p:nvGrpSpPr>
+        <p:grpSpPr>
+          <a:xfrm>
+            <a:off x="7275008" y="2074313"/>
+            <a:ext cx="3759845" cy="1332621"/>
+            <a:chOff x="7122608" y="1895296"/>
+            <a:chExt cx="3759845" cy="1332621"/>
+          </a:xfrm>
+        </p:grpSpPr>
+        <p:grpSp>
+          <p:nvGrpSpPr>
+            <p:cNvPr id="106" name="Group 105">
+              <a:extLst>
+                <a:ext uri="{FF2B5EF4-FFF2-40B4-BE49-F238E27FC236}">
+                  <a16:creationId xmlns:a16="http://schemas.microsoft.com/office/drawing/2014/main" id="{BBB30DE4-BC6D-4E61-83EE-9283CA2D74BA}"/>
+                </a:ext>
+              </a:extLst>
+            </p:cNvPr>
+            <p:cNvGrpSpPr/>
+            <p:nvPr/>
+          </p:nvGrpSpPr>
+          <p:grpSpPr>
+            <a:xfrm>
+              <a:off x="7122608" y="1895296"/>
+              <a:ext cx="3276876" cy="1332621"/>
+              <a:chOff x="6576646" y="1503485"/>
+              <a:chExt cx="3276876" cy="1332621"/>
+            </a:xfrm>
+          </p:grpSpPr>
+          <p:sp>
+            <p:nvSpPr>
+              <p:cNvPr id="109" name="Oval 108">
+                <a:extLst>
+                  <a:ext uri="{FF2B5EF4-FFF2-40B4-BE49-F238E27FC236}">
+                    <a16:creationId xmlns:a16="http://schemas.microsoft.com/office/drawing/2014/main" id="{DFF6AE16-AB1A-4B42-BAB2-34A0D984406C}"/>
+                  </a:ext>
+                </a:extLst>
+              </p:cNvPr>
+              <p:cNvSpPr/>
+              <p:nvPr/>
+            </p:nvSpPr>
+            <p:spPr>
+              <a:xfrm>
+                <a:off x="7546730" y="1503485"/>
+                <a:ext cx="548640" cy="548640"/>
+              </a:xfrm>
+              <a:prstGeom prst="ellipse">
+                <a:avLst/>
+              </a:prstGeom>
+              <a:ln w="28575">
+                <a:solidFill>
+                  <a:srgbClr val="7030A0"/>
+                </a:solidFill>
+              </a:ln>
+            </p:spPr>
+            <p:style>
+              <a:lnRef idx="2">
+                <a:schemeClr val="dk1"/>
+              </a:lnRef>
+              <a:fillRef idx="1">
+                <a:schemeClr val="lt1"/>
+              </a:fillRef>
+              <a:effectRef idx="0">
+                <a:schemeClr val="dk1"/>
+              </a:effectRef>
+              <a:fontRef idx="minor">
+                <a:schemeClr val="dk1"/>
+              </a:fontRef>
+            </p:style>
+            <p:txBody>
+              <a:bodyPr rtlCol="0" anchor="ctr"/>
+              <a:lstStyle/>
+              <a:p>
+                <a:pPr algn="ctr"/>
+                <a:r>
+                  <a:rPr lang="en-US" sz="1400" b="1" dirty="0"/>
+                  <a:t>2</a:t>
+                </a:r>
+              </a:p>
+            </p:txBody>
+          </p:sp>
+          <p:sp>
+            <p:nvSpPr>
+              <p:cNvPr id="110" name="Oval 109">
+                <a:extLst>
+                  <a:ext uri="{FF2B5EF4-FFF2-40B4-BE49-F238E27FC236}">
+                    <a16:creationId xmlns:a16="http://schemas.microsoft.com/office/drawing/2014/main" id="{DF85DC02-5632-4A41-AB2C-CC180E1413D5}"/>
+                  </a:ext>
+                </a:extLst>
+              </p:cNvPr>
+              <p:cNvSpPr/>
+              <p:nvPr/>
+            </p:nvSpPr>
+            <p:spPr>
+              <a:xfrm>
+                <a:off x="8583563" y="2284266"/>
+                <a:ext cx="548640" cy="548640"/>
+              </a:xfrm>
+              <a:prstGeom prst="ellipse">
+                <a:avLst/>
+              </a:prstGeom>
+              <a:ln w="19050">
+                <a:solidFill>
+                  <a:schemeClr val="accent4">
+                    <a:lumMod val="75000"/>
+                  </a:schemeClr>
+                </a:solidFill>
+              </a:ln>
+            </p:spPr>
+            <p:style>
+              <a:lnRef idx="2">
+                <a:schemeClr val="dk1"/>
+              </a:lnRef>
+              <a:fillRef idx="1">
+                <a:schemeClr val="lt1"/>
+              </a:fillRef>
+              <a:effectRef idx="0">
+                <a:schemeClr val="dk1"/>
+              </a:effectRef>
+              <a:fontRef idx="minor">
+                <a:schemeClr val="dk1"/>
+              </a:fontRef>
+            </p:style>
+            <p:txBody>
+              <a:bodyPr rtlCol="0" anchor="ctr"/>
+              <a:lstStyle/>
+              <a:p>
+                <a:pPr algn="ctr"/>
+                <a:r>
+                  <a:rPr lang="en-US" sz="1400" b="1" dirty="0"/>
+                  <a:t>9</a:t>
+                </a:r>
+              </a:p>
+            </p:txBody>
+          </p:sp>
+          <p:sp>
+            <p:nvSpPr>
+              <p:cNvPr id="111" name="Oval 110">
+                <a:extLst>
+                  <a:ext uri="{FF2B5EF4-FFF2-40B4-BE49-F238E27FC236}">
+                    <a16:creationId xmlns:a16="http://schemas.microsoft.com/office/drawing/2014/main" id="{6B3B49BA-3FEA-4DE4-BE21-BC29440DF638}"/>
                   </a:ext>
                 </a:extLst>
               </p:cNvPr>
@@ -8496,17 +8566,17 @@
           </p:sp>
           <p:cxnSp>
             <p:nvCxnSpPr>
-              <p:cNvPr id="88" name="Connector: Curved 87">
+              <p:cNvPr id="112" name="Connector: Curved 111">
                 <a:extLst>
                   <a:ext uri="{FF2B5EF4-FFF2-40B4-BE49-F238E27FC236}">
-                    <a16:creationId xmlns:a16="http://schemas.microsoft.com/office/drawing/2014/main" id="{9088A99B-02EC-4342-BD39-F873438627E1}"/>
+                    <a16:creationId xmlns:a16="http://schemas.microsoft.com/office/drawing/2014/main" id="{53E56368-21C7-4A5B-BFBE-3F7D2F1519AC}"/>
                   </a:ext>
                 </a:extLst>
               </p:cNvPr>
               <p:cNvCxnSpPr>
                 <a:cxnSpLocks/>
-                <a:stCxn id="78" idx="4"/>
-                <a:endCxn id="85" idx="0"/>
+                <a:stCxn id="109" idx="4"/>
+                <a:endCxn id="111" idx="0"/>
               </p:cNvCxnSpPr>
               <p:nvPr/>
             </p:nvCxnSpPr>
@@ -8538,10 +8608,10 @@
           </p:cxnSp>
           <p:sp>
             <p:nvSpPr>
-              <p:cNvPr id="96" name="TextBox 95">
+              <p:cNvPr id="113" name="TextBox 112">
                 <a:extLst>
                   <a:ext uri="{FF2B5EF4-FFF2-40B4-BE49-F238E27FC236}">
-                    <a16:creationId xmlns:a16="http://schemas.microsoft.com/office/drawing/2014/main" id="{97A16F34-E655-4B63-B1C8-BC615299CF9D}"/>
+                    <a16:creationId xmlns:a16="http://schemas.microsoft.com/office/drawing/2014/main" id="{EE58444C-4B46-4BC7-BE3B-F294A17AF59D}"/>
                   </a:ext>
                 </a:extLst>
               </p:cNvPr>
@@ -8606,17 +8676,17 @@
         </p:grpSp>
         <p:cxnSp>
           <p:nvCxnSpPr>
-            <p:cNvPr id="99" name="Connector: Curved 98">
+            <p:cNvPr id="107" name="Connector: Curved 106">
               <a:extLst>
                 <a:ext uri="{FF2B5EF4-FFF2-40B4-BE49-F238E27FC236}">
-                  <a16:creationId xmlns:a16="http://schemas.microsoft.com/office/drawing/2014/main" id="{FF3A778F-1432-4797-BE2C-7983FE7E52C6}"/>
+                  <a16:creationId xmlns:a16="http://schemas.microsoft.com/office/drawing/2014/main" id="{43D39828-B5A6-4C60-A0BF-2B14726E0D34}"/>
                 </a:ext>
               </a:extLst>
             </p:cNvPr>
             <p:cNvCxnSpPr>
               <a:cxnSpLocks/>
-              <a:stCxn id="78" idx="4"/>
-              <a:endCxn id="79" idx="0"/>
+              <a:stCxn id="109" idx="4"/>
+              <a:endCxn id="110" idx="0"/>
             </p:cNvCxnSpPr>
             <p:nvPr/>
           </p:nvCxnSpPr>
@@ -8648,10 +8718,10 @@
         </p:cxnSp>
         <p:sp>
           <p:nvSpPr>
-            <p:cNvPr id="102" name="TextBox 101">
+            <p:cNvPr id="108" name="TextBox 107">
               <a:extLst>
                 <a:ext uri="{FF2B5EF4-FFF2-40B4-BE49-F238E27FC236}">
-                  <a16:creationId xmlns:a16="http://schemas.microsoft.com/office/drawing/2014/main" id="{44E9582C-937F-41AB-9DDD-5D039771C7A7}"/>
+                  <a16:creationId xmlns:a16="http://schemas.microsoft.com/office/drawing/2014/main" id="{F94D727E-E8DB-45E3-A5D2-05D0400B0567}"/>
                 </a:ext>
               </a:extLst>
             </p:cNvPr>
@@ -8696,55 +8766,570 @@
           </p:txBody>
         </p:sp>
       </p:grpSp>
-      <p:sp>
-        <p:nvSpPr>
-          <p:cNvPr id="104" name="TextBox 103">
-            <a:extLst>
-              <a:ext uri="{FF2B5EF4-FFF2-40B4-BE49-F238E27FC236}">
-                <a16:creationId xmlns:a16="http://schemas.microsoft.com/office/drawing/2014/main" id="{112F57C8-22BE-425C-8327-CBDB53206FD4}"/>
-              </a:ext>
-            </a:extLst>
-          </p:cNvPr>
-          <p:cNvSpPr txBox="1"/>
+      <p:grpSp>
+        <p:nvGrpSpPr>
+          <p:cNvPr id="119" name="Group 118">
+            <a:extLst>
+              <a:ext uri="{FF2B5EF4-FFF2-40B4-BE49-F238E27FC236}">
+                <a16:creationId xmlns:a16="http://schemas.microsoft.com/office/drawing/2014/main" id="{478C9A1B-6FC0-44E6-BF70-852CD6DC65E2}"/>
+              </a:ext>
+            </a:extLst>
+          </p:cNvPr>
+          <p:cNvGrpSpPr/>
           <p:nvPr/>
-        </p:nvSpPr>
-        <p:spPr>
+        </p:nvGrpSpPr>
+        <p:grpSpPr>
           <a:xfrm>
-            <a:off x="7671248" y="2854820"/>
-            <a:ext cx="1170513" cy="276999"/>
+            <a:off x="6913809" y="4595845"/>
+            <a:ext cx="3142337" cy="1332621"/>
+            <a:chOff x="6913809" y="4595845"/>
+            <a:chExt cx="3142337" cy="1332621"/>
           </a:xfrm>
-          <a:prstGeom prst="rect">
-            <a:avLst/>
-          </a:prstGeom>
-          <a:noFill/>
-        </p:spPr>
-        <p:txBody>
-          <a:bodyPr wrap="none" rtlCol="0">
-            <a:spAutoFit/>
-          </a:bodyPr>
-          <a:lstStyle/>
-          <a:p>
-            <a:r>
-              <a:rPr lang="en-US" sz="1200" b="1" dirty="0">
-                <a:solidFill>
-                  <a:schemeClr val="accent4">
-                    <a:lumMod val="75000"/>
-                  </a:schemeClr>
-                </a:solidFill>
-              </a:rPr>
-              <a:t>child node of </a:t>
-            </a:r>
-            <a:r>
-              <a:rPr lang="en-US" sz="1200" b="1" dirty="0">
-                <a:solidFill>
-                  <a:srgbClr val="7030A0"/>
-                </a:solidFill>
-              </a:rPr>
-              <a:t>2</a:t>
-            </a:r>
-          </a:p>
-        </p:txBody>
-      </p:sp>
+        </p:grpSpPr>
+        <p:grpSp>
+          <p:nvGrpSpPr>
+            <p:cNvPr id="116" name="Group 115">
+              <a:extLst>
+                <a:ext uri="{FF2B5EF4-FFF2-40B4-BE49-F238E27FC236}">
+                  <a16:creationId xmlns:a16="http://schemas.microsoft.com/office/drawing/2014/main" id="{6B43DB4E-E94C-4BB0-B203-4853303DE48E}"/>
+                </a:ext>
+              </a:extLst>
+            </p:cNvPr>
+            <p:cNvGrpSpPr/>
+            <p:nvPr/>
+          </p:nvGrpSpPr>
+          <p:grpSpPr>
+            <a:xfrm>
+              <a:off x="6913809" y="4595845"/>
+              <a:ext cx="3142337" cy="1332621"/>
+              <a:chOff x="6913809" y="4595845"/>
+              <a:chExt cx="3142337" cy="1332621"/>
+            </a:xfrm>
+          </p:grpSpPr>
+          <p:grpSp>
+            <p:nvGrpSpPr>
+              <p:cNvPr id="103" name="Group 102">
+                <a:extLst>
+                  <a:ext uri="{FF2B5EF4-FFF2-40B4-BE49-F238E27FC236}">
+                    <a16:creationId xmlns:a16="http://schemas.microsoft.com/office/drawing/2014/main" id="{693A5BBD-E50F-451D-AE98-94BDCAA1AA7E}"/>
+                  </a:ext>
+                </a:extLst>
+              </p:cNvPr>
+              <p:cNvGrpSpPr/>
+              <p:nvPr/>
+            </p:nvGrpSpPr>
+            <p:grpSpPr>
+              <a:xfrm>
+                <a:off x="6913809" y="4595845"/>
+                <a:ext cx="2555557" cy="1332621"/>
+                <a:chOff x="7122608" y="1895296"/>
+                <a:chExt cx="2555557" cy="1332621"/>
+              </a:xfrm>
+            </p:grpSpPr>
+            <p:grpSp>
+              <p:nvGrpSpPr>
+                <p:cNvPr id="77" name="Group 76">
+                  <a:extLst>
+                    <a:ext uri="{FF2B5EF4-FFF2-40B4-BE49-F238E27FC236}">
+                      <a16:creationId xmlns:a16="http://schemas.microsoft.com/office/drawing/2014/main" id="{C4B1B35B-7BD6-4A3A-9FEB-391A61FC2CD5}"/>
+                    </a:ext>
+                  </a:extLst>
+                </p:cNvPr>
+                <p:cNvGrpSpPr/>
+                <p:nvPr/>
+              </p:nvGrpSpPr>
+              <p:grpSpPr>
+                <a:xfrm>
+                  <a:off x="7122608" y="1895296"/>
+                  <a:ext cx="2555557" cy="1332621"/>
+                  <a:chOff x="6576646" y="1503485"/>
+                  <a:chExt cx="2555557" cy="1332621"/>
+                </a:xfrm>
+              </p:grpSpPr>
+              <p:sp>
+                <p:nvSpPr>
+                  <p:cNvPr id="78" name="Oval 77">
+                    <a:extLst>
+                      <a:ext uri="{FF2B5EF4-FFF2-40B4-BE49-F238E27FC236}">
+                        <a16:creationId xmlns:a16="http://schemas.microsoft.com/office/drawing/2014/main" id="{6A3DF219-689D-43C1-89C2-4A8ABA4C19EB}"/>
+                      </a:ext>
+                    </a:extLst>
+                  </p:cNvPr>
+                  <p:cNvSpPr/>
+                  <p:nvPr/>
+                </p:nvSpPr>
+                <p:spPr>
+                  <a:xfrm>
+                    <a:off x="7546730" y="1503485"/>
+                    <a:ext cx="548640" cy="548640"/>
+                  </a:xfrm>
+                  <a:prstGeom prst="ellipse">
+                    <a:avLst/>
+                  </a:prstGeom>
+                  <a:ln w="28575">
+                    <a:solidFill>
+                      <a:srgbClr val="7030A0"/>
+                    </a:solidFill>
+                  </a:ln>
+                </p:spPr>
+                <p:style>
+                  <a:lnRef idx="2">
+                    <a:schemeClr val="dk1"/>
+                  </a:lnRef>
+                  <a:fillRef idx="1">
+                    <a:schemeClr val="lt1"/>
+                  </a:fillRef>
+                  <a:effectRef idx="0">
+                    <a:schemeClr val="dk1"/>
+                  </a:effectRef>
+                  <a:fontRef idx="minor">
+                    <a:schemeClr val="dk1"/>
+                  </a:fontRef>
+                </p:style>
+                <p:txBody>
+                  <a:bodyPr rtlCol="0" anchor="ctr"/>
+                  <a:lstStyle/>
+                  <a:p>
+                    <a:pPr algn="ctr"/>
+                    <a:r>
+                      <a:rPr lang="en-US" sz="1400" b="1" dirty="0"/>
+                      <a:t>2</a:t>
+                    </a:r>
+                  </a:p>
+                </p:txBody>
+              </p:sp>
+              <p:sp>
+                <p:nvSpPr>
+                  <p:cNvPr id="79" name="Oval 78">
+                    <a:extLst>
+                      <a:ext uri="{FF2B5EF4-FFF2-40B4-BE49-F238E27FC236}">
+                        <a16:creationId xmlns:a16="http://schemas.microsoft.com/office/drawing/2014/main" id="{3E4E3EF3-92BF-4D62-9AB0-CA9B39D4E13E}"/>
+                      </a:ext>
+                    </a:extLst>
+                  </p:cNvPr>
+                  <p:cNvSpPr/>
+                  <p:nvPr/>
+                </p:nvSpPr>
+                <p:spPr>
+                  <a:xfrm>
+                    <a:off x="8583563" y="2284266"/>
+                    <a:ext cx="548640" cy="548640"/>
+                  </a:xfrm>
+                  <a:prstGeom prst="ellipse">
+                    <a:avLst/>
+                  </a:prstGeom>
+                  <a:ln w="19050">
+                    <a:solidFill>
+                      <a:srgbClr val="7030A0"/>
+                    </a:solidFill>
+                  </a:ln>
+                </p:spPr>
+                <p:style>
+                  <a:lnRef idx="2">
+                    <a:schemeClr val="dk1"/>
+                  </a:lnRef>
+                  <a:fillRef idx="1">
+                    <a:schemeClr val="lt1"/>
+                  </a:fillRef>
+                  <a:effectRef idx="0">
+                    <a:schemeClr val="dk1"/>
+                  </a:effectRef>
+                  <a:fontRef idx="minor">
+                    <a:schemeClr val="dk1"/>
+                  </a:fontRef>
+                </p:style>
+                <p:txBody>
+                  <a:bodyPr rtlCol="0" anchor="ctr"/>
+                  <a:lstStyle/>
+                  <a:p>
+                    <a:pPr algn="ctr"/>
+                    <a:r>
+                      <a:rPr lang="en-US" sz="1400" b="1" dirty="0"/>
+                      <a:t>9</a:t>
+                    </a:r>
+                  </a:p>
+                </p:txBody>
+              </p:sp>
+              <p:sp>
+                <p:nvSpPr>
+                  <p:cNvPr id="85" name="Oval 84">
+                    <a:extLst>
+                      <a:ext uri="{FF2B5EF4-FFF2-40B4-BE49-F238E27FC236}">
+                        <a16:creationId xmlns:a16="http://schemas.microsoft.com/office/drawing/2014/main" id="{E41FDE4B-E3B8-4970-B98E-2C7322055242}"/>
+                      </a:ext>
+                    </a:extLst>
+                  </p:cNvPr>
+                  <p:cNvSpPr/>
+                  <p:nvPr/>
+                </p:nvSpPr>
+                <p:spPr>
+                  <a:xfrm>
+                    <a:off x="6576646" y="2287466"/>
+                    <a:ext cx="548640" cy="548640"/>
+                  </a:xfrm>
+                  <a:prstGeom prst="ellipse">
+                    <a:avLst/>
+                  </a:prstGeom>
+                  <a:ln w="19050">
+                    <a:solidFill>
+                      <a:srgbClr val="7030A0"/>
+                    </a:solidFill>
+                  </a:ln>
+                </p:spPr>
+                <p:style>
+                  <a:lnRef idx="2">
+                    <a:schemeClr val="dk1"/>
+                  </a:lnRef>
+                  <a:fillRef idx="1">
+                    <a:schemeClr val="lt1"/>
+                  </a:fillRef>
+                  <a:effectRef idx="0">
+                    <a:schemeClr val="dk1"/>
+                  </a:effectRef>
+                  <a:fontRef idx="minor">
+                    <a:schemeClr val="dk1"/>
+                  </a:fontRef>
+                </p:style>
+                <p:txBody>
+                  <a:bodyPr rtlCol="0" anchor="ctr"/>
+                  <a:lstStyle/>
+                  <a:p>
+                    <a:pPr algn="ctr"/>
+                    <a:r>
+                      <a:rPr lang="en-US" sz="1400" b="1" dirty="0"/>
+                      <a:t>7</a:t>
+                    </a:r>
+                  </a:p>
+                </p:txBody>
+              </p:sp>
+              <p:cxnSp>
+                <p:nvCxnSpPr>
+                  <p:cNvPr id="88" name="Connector: Curved 87">
+                    <a:extLst>
+                      <a:ext uri="{FF2B5EF4-FFF2-40B4-BE49-F238E27FC236}">
+                        <a16:creationId xmlns:a16="http://schemas.microsoft.com/office/drawing/2014/main" id="{9088A99B-02EC-4342-BD39-F873438627E1}"/>
+                      </a:ext>
+                    </a:extLst>
+                  </p:cNvPr>
+                  <p:cNvCxnSpPr>
+                    <a:cxnSpLocks/>
+                    <a:stCxn id="78" idx="4"/>
+                    <a:endCxn id="85" idx="0"/>
+                  </p:cNvCxnSpPr>
+                  <p:nvPr/>
+                </p:nvCxnSpPr>
+                <p:spPr>
+                  <a:xfrm rot="5400000">
+                    <a:off x="7218338" y="1684753"/>
+                    <a:ext cx="235341" cy="970084"/>
+                  </a:xfrm>
+                  <a:prstGeom prst="curvedConnector3">
+                    <a:avLst>
+                      <a:gd name="adj1" fmla="val 50000"/>
+                    </a:avLst>
+                  </a:prstGeom>
+                  <a:ln>
+                    <a:solidFill>
+                      <a:schemeClr val="accent4">
+                        <a:lumMod val="75000"/>
+                      </a:schemeClr>
+                    </a:solidFill>
+                  </a:ln>
+                </p:spPr>
+                <p:style>
+                  <a:lnRef idx="3">
+                    <a:schemeClr val="accent1"/>
+                  </a:lnRef>
+                  <a:fillRef idx="0">
+                    <a:schemeClr val="accent1"/>
+                  </a:fillRef>
+                  <a:effectRef idx="2">
+                    <a:schemeClr val="accent1"/>
+                  </a:effectRef>
+                  <a:fontRef idx="minor">
+                    <a:schemeClr val="tx1"/>
+                  </a:fontRef>
+                </p:style>
+              </p:cxnSp>
+              <p:sp>
+                <p:nvSpPr>
+                  <p:cNvPr id="96" name="TextBox 95">
+                    <a:extLst>
+                      <a:ext uri="{FF2B5EF4-FFF2-40B4-BE49-F238E27FC236}">
+                        <a16:creationId xmlns:a16="http://schemas.microsoft.com/office/drawing/2014/main" id="{97A16F34-E655-4B63-B1C8-BC615299CF9D}"/>
+                      </a:ext>
+                    </a:extLst>
+                  </p:cNvPr>
+                  <p:cNvSpPr txBox="1"/>
+                  <p:nvPr/>
+                </p:nvSpPr>
+                <p:spPr>
+                  <a:xfrm>
+                    <a:off x="8211662" y="1614100"/>
+                    <a:ext cx="511679" cy="276999"/>
+                  </a:xfrm>
+                  <a:prstGeom prst="rect">
+                    <a:avLst/>
+                  </a:prstGeom>
+                  <a:noFill/>
+                </p:spPr>
+                <p:txBody>
+                  <a:bodyPr wrap="none" rtlCol="0">
+                    <a:spAutoFit/>
+                  </a:bodyPr>
+                  <a:lstStyle/>
+                  <a:p>
+                    <a:r>
+                      <a:rPr lang="en-US" sz="1200" b="1" dirty="0">
+                        <a:solidFill>
+                          <a:srgbClr val="7030A0"/>
+                        </a:solidFill>
+                      </a:rPr>
+                      <a:t>node</a:t>
+                    </a:r>
+                    <a:endParaRPr lang="en-US" sz="1200" b="1" dirty="0">
+                      <a:solidFill>
+                        <a:schemeClr val="accent4">
+                          <a:lumMod val="75000"/>
+                        </a:schemeClr>
+                      </a:solidFill>
+                    </a:endParaRPr>
+                  </a:p>
+                </p:txBody>
+              </p:sp>
+            </p:grpSp>
+            <p:cxnSp>
+              <p:nvCxnSpPr>
+                <p:cNvPr id="99" name="Connector: Curved 98">
+                  <a:extLst>
+                    <a:ext uri="{FF2B5EF4-FFF2-40B4-BE49-F238E27FC236}">
+                      <a16:creationId xmlns:a16="http://schemas.microsoft.com/office/drawing/2014/main" id="{FF3A778F-1432-4797-BE2C-7983FE7E52C6}"/>
+                    </a:ext>
+                  </a:extLst>
+                </p:cNvPr>
+                <p:cNvCxnSpPr>
+                  <a:cxnSpLocks/>
+                  <a:stCxn id="78" idx="4"/>
+                  <a:endCxn id="79" idx="0"/>
+                </p:cNvCxnSpPr>
+                <p:nvPr/>
+              </p:nvCxnSpPr>
+              <p:spPr>
+                <a:xfrm rot="16200000" flipH="1">
+                  <a:off x="8769358" y="2041589"/>
+                  <a:ext cx="232141" cy="1036833"/>
+                </a:xfrm>
+                <a:prstGeom prst="curvedConnector3">
+                  <a:avLst>
+                    <a:gd name="adj1" fmla="val 50000"/>
+                  </a:avLst>
+                </a:prstGeom>
+                <a:ln>
+                  <a:solidFill>
+                    <a:schemeClr val="accent4">
+                      <a:lumMod val="75000"/>
+                    </a:schemeClr>
+                  </a:solidFill>
+                </a:ln>
+              </p:spPr>
+              <p:style>
+                <a:lnRef idx="3">
+                  <a:schemeClr val="accent1"/>
+                </a:lnRef>
+                <a:fillRef idx="0">
+                  <a:schemeClr val="accent1"/>
+                </a:fillRef>
+                <a:effectRef idx="2">
+                  <a:schemeClr val="accent1"/>
+                </a:effectRef>
+                <a:fontRef idx="minor">
+                  <a:schemeClr val="tx1"/>
+                </a:fontRef>
+              </p:style>
+            </p:cxnSp>
+          </p:grpSp>
+          <p:sp>
+            <p:nvSpPr>
+              <p:cNvPr id="114" name="TextBox 113">
+                <a:extLst>
+                  <a:ext uri="{FF2B5EF4-FFF2-40B4-BE49-F238E27FC236}">
+                    <a16:creationId xmlns:a16="http://schemas.microsoft.com/office/drawing/2014/main" id="{83F0BA8D-B28C-4990-A1CC-7CC4699E5A92}"/>
+                  </a:ext>
+                </a:extLst>
+              </p:cNvPr>
+              <p:cNvSpPr txBox="1"/>
+              <p:nvPr/>
+            </p:nvSpPr>
+            <p:spPr>
+              <a:xfrm>
+                <a:off x="9544467" y="5485406"/>
+                <a:ext cx="511679" cy="276999"/>
+              </a:xfrm>
+              <a:prstGeom prst="rect">
+                <a:avLst/>
+              </a:prstGeom>
+              <a:noFill/>
+            </p:spPr>
+            <p:txBody>
+              <a:bodyPr wrap="none" rtlCol="0">
+                <a:spAutoFit/>
+              </a:bodyPr>
+              <a:lstStyle/>
+              <a:p>
+                <a:r>
+                  <a:rPr lang="en-US" sz="1200" b="1" dirty="0">
+                    <a:solidFill>
+                      <a:srgbClr val="7030A0"/>
+                    </a:solidFill>
+                  </a:rPr>
+                  <a:t>node</a:t>
+                </a:r>
+                <a:endParaRPr lang="en-US" sz="1200" b="1" dirty="0">
+                  <a:solidFill>
+                    <a:schemeClr val="accent4">
+                      <a:lumMod val="75000"/>
+                    </a:schemeClr>
+                  </a:solidFill>
+                </a:endParaRPr>
+              </a:p>
+            </p:txBody>
+          </p:sp>
+          <p:sp>
+            <p:nvSpPr>
+              <p:cNvPr id="115" name="TextBox 114">
+                <a:extLst>
+                  <a:ext uri="{FF2B5EF4-FFF2-40B4-BE49-F238E27FC236}">
+                    <a16:creationId xmlns:a16="http://schemas.microsoft.com/office/drawing/2014/main" id="{A33E4409-BBFF-4C6A-A432-15663757A98C}"/>
+                  </a:ext>
+                </a:extLst>
+              </p:cNvPr>
+              <p:cNvSpPr txBox="1"/>
+              <p:nvPr/>
+            </p:nvSpPr>
+            <p:spPr>
+              <a:xfrm>
+                <a:off x="7492983" y="5485406"/>
+                <a:ext cx="511679" cy="276999"/>
+              </a:xfrm>
+              <a:prstGeom prst="rect">
+                <a:avLst/>
+              </a:prstGeom>
+              <a:noFill/>
+            </p:spPr>
+            <p:txBody>
+              <a:bodyPr wrap="none" rtlCol="0">
+                <a:spAutoFit/>
+              </a:bodyPr>
+              <a:lstStyle/>
+              <a:p>
+                <a:r>
+                  <a:rPr lang="en-US" sz="1200" b="1" dirty="0">
+                    <a:solidFill>
+                      <a:srgbClr val="7030A0"/>
+                    </a:solidFill>
+                  </a:rPr>
+                  <a:t>node</a:t>
+                </a:r>
+                <a:endParaRPr lang="en-US" sz="1200" b="1" dirty="0">
+                  <a:solidFill>
+                    <a:schemeClr val="accent4">
+                      <a:lumMod val="75000"/>
+                    </a:schemeClr>
+                  </a:solidFill>
+                </a:endParaRPr>
+              </a:p>
+            </p:txBody>
+          </p:sp>
+        </p:grpSp>
+        <p:sp>
+          <p:nvSpPr>
+            <p:cNvPr id="117" name="TextBox 116">
+              <a:extLst>
+                <a:ext uri="{FF2B5EF4-FFF2-40B4-BE49-F238E27FC236}">
+                  <a16:creationId xmlns:a16="http://schemas.microsoft.com/office/drawing/2014/main" id="{5114B5FF-7258-44C5-B5B6-7AECECE74754}"/>
+                </a:ext>
+              </a:extLst>
+            </p:cNvPr>
+            <p:cNvSpPr txBox="1"/>
+            <p:nvPr/>
+          </p:nvSpPr>
+          <p:spPr>
+            <a:xfrm>
+              <a:off x="8292479" y="5219280"/>
+              <a:ext cx="493981" cy="276999"/>
+            </a:xfrm>
+            <a:prstGeom prst="rect">
+              <a:avLst/>
+            </a:prstGeom>
+            <a:noFill/>
+            <a:ln>
+              <a:noFill/>
+            </a:ln>
+          </p:spPr>
+          <p:txBody>
+            <a:bodyPr wrap="none" rtlCol="0">
+              <a:spAutoFit/>
+            </a:bodyPr>
+            <a:lstStyle/>
+            <a:p>
+              <a:r>
+                <a:rPr lang="en-US" sz="1200" b="1" dirty="0">
+                  <a:solidFill>
+                    <a:schemeClr val="accent4">
+                      <a:lumMod val="75000"/>
+                    </a:schemeClr>
+                  </a:solidFill>
+                </a:rPr>
+                <a:t>edge</a:t>
+              </a:r>
+            </a:p>
+          </p:txBody>
+        </p:sp>
+        <p:sp>
+          <p:nvSpPr>
+            <p:cNvPr id="118" name="TextBox 117">
+              <a:extLst>
+                <a:ext uri="{FF2B5EF4-FFF2-40B4-BE49-F238E27FC236}">
+                  <a16:creationId xmlns:a16="http://schemas.microsoft.com/office/drawing/2014/main" id="{6FA9B4D0-F4E5-43F2-BC24-BC1B748ABD99}"/>
+                </a:ext>
+              </a:extLst>
+            </p:cNvPr>
+            <p:cNvSpPr txBox="1"/>
+            <p:nvPr/>
+          </p:nvSpPr>
+          <p:spPr>
+            <a:xfrm>
+              <a:off x="7626681" y="5224571"/>
+              <a:ext cx="493981" cy="276999"/>
+            </a:xfrm>
+            <a:prstGeom prst="rect">
+              <a:avLst/>
+            </a:prstGeom>
+            <a:noFill/>
+            <a:ln>
+              <a:noFill/>
+            </a:ln>
+          </p:spPr>
+          <p:txBody>
+            <a:bodyPr wrap="none" rtlCol="0">
+              <a:spAutoFit/>
+            </a:bodyPr>
+            <a:lstStyle/>
+            <a:p>
+              <a:r>
+                <a:rPr lang="en-US" sz="1200" b="1" dirty="0">
+                  <a:solidFill>
+                    <a:schemeClr val="accent4">
+                      <a:lumMod val="75000"/>
+                    </a:schemeClr>
+                  </a:solidFill>
+                </a:rPr>
+                <a:t>edge</a:t>
+              </a:r>
+            </a:p>
+          </p:txBody>
+        </p:sp>
+      </p:grpSp>
     </p:spTree>
     <p:extLst>
       <p:ext uri="{BB962C8B-B14F-4D97-AF65-F5344CB8AC3E}">

</xml_diff>